<commit_message>
Significant changes in materials relating to Data Binding and MVVM
Introduction and use of RelayCommand class (contains parameters of
function-types) has been removed.
The class MasterViewModel has been removed, and its functionality is now
part of MasterDetailsViewModel class
</commit_message>
<xml_diff>
--- a/CSharpProgramming/Presentations/MVVM ViewModel Klasser.pptx
+++ b/CSharpProgramming/Presentations/MVVM ViewModel Klasser.pptx
@@ -42,9 +42,10 @@
     <p:sldId id="354" r:id="rId40"/>
     <p:sldId id="355" r:id="rId41"/>
     <p:sldId id="356" r:id="rId42"/>
-    <p:sldId id="285" r:id="rId43"/>
-    <p:sldId id="288" r:id="rId44"/>
-    <p:sldId id="289" r:id="rId45"/>
+    <p:sldId id="363" r:id="rId43"/>
+    <p:sldId id="285" r:id="rId44"/>
+    <p:sldId id="288" r:id="rId45"/>
+    <p:sldId id="289" r:id="rId46"/>
   </p:sldIdLst>
   <p:sldSz cx="12192000" cy="6858000"/>
   <p:notesSz cx="6858000" cy="9144000"/>
@@ -282,7 +283,7 @@
           <a:p>
             <a:fld id="{7D0932B6-9F57-4BEA-85B8-88D24CCD4274}" type="datetimeFigureOut">
               <a:rPr lang="da-DK" smtClean="0"/>
-              <a:t>09-11-2017</a:t>
+              <a:t>11-11-2017</a:t>
             </a:fld>
             <a:endParaRPr lang="da-DK"/>
           </a:p>
@@ -452,7 +453,7 @@
           <a:p>
             <a:fld id="{7D0932B6-9F57-4BEA-85B8-88D24CCD4274}" type="datetimeFigureOut">
               <a:rPr lang="da-DK" smtClean="0"/>
-              <a:t>09-11-2017</a:t>
+              <a:t>11-11-2017</a:t>
             </a:fld>
             <a:endParaRPr lang="da-DK"/>
           </a:p>
@@ -632,7 +633,7 @@
           <a:p>
             <a:fld id="{7D0932B6-9F57-4BEA-85B8-88D24CCD4274}" type="datetimeFigureOut">
               <a:rPr lang="da-DK" smtClean="0"/>
-              <a:t>09-11-2017</a:t>
+              <a:t>11-11-2017</a:t>
             </a:fld>
             <a:endParaRPr lang="da-DK"/>
           </a:p>
@@ -802,7 +803,7 @@
           <a:p>
             <a:fld id="{7D0932B6-9F57-4BEA-85B8-88D24CCD4274}" type="datetimeFigureOut">
               <a:rPr lang="da-DK" smtClean="0"/>
-              <a:t>09-11-2017</a:t>
+              <a:t>11-11-2017</a:t>
             </a:fld>
             <a:endParaRPr lang="da-DK"/>
           </a:p>
@@ -1048,7 +1049,7 @@
           <a:p>
             <a:fld id="{7D0932B6-9F57-4BEA-85B8-88D24CCD4274}" type="datetimeFigureOut">
               <a:rPr lang="da-DK" smtClean="0"/>
-              <a:t>09-11-2017</a:t>
+              <a:t>11-11-2017</a:t>
             </a:fld>
             <a:endParaRPr lang="da-DK"/>
           </a:p>
@@ -1280,7 +1281,7 @@
           <a:p>
             <a:fld id="{7D0932B6-9F57-4BEA-85B8-88D24CCD4274}" type="datetimeFigureOut">
               <a:rPr lang="da-DK" smtClean="0"/>
-              <a:t>09-11-2017</a:t>
+              <a:t>11-11-2017</a:t>
             </a:fld>
             <a:endParaRPr lang="da-DK"/>
           </a:p>
@@ -1647,7 +1648,7 @@
           <a:p>
             <a:fld id="{7D0932B6-9F57-4BEA-85B8-88D24CCD4274}" type="datetimeFigureOut">
               <a:rPr lang="da-DK" smtClean="0"/>
-              <a:t>09-11-2017</a:t>
+              <a:t>11-11-2017</a:t>
             </a:fld>
             <a:endParaRPr lang="da-DK"/>
           </a:p>
@@ -1765,7 +1766,7 @@
           <a:p>
             <a:fld id="{7D0932B6-9F57-4BEA-85B8-88D24CCD4274}" type="datetimeFigureOut">
               <a:rPr lang="da-DK" smtClean="0"/>
-              <a:t>09-11-2017</a:t>
+              <a:t>11-11-2017</a:t>
             </a:fld>
             <a:endParaRPr lang="da-DK"/>
           </a:p>
@@ -1860,7 +1861,7 @@
           <a:p>
             <a:fld id="{7D0932B6-9F57-4BEA-85B8-88D24CCD4274}" type="datetimeFigureOut">
               <a:rPr lang="da-DK" smtClean="0"/>
-              <a:t>09-11-2017</a:t>
+              <a:t>11-11-2017</a:t>
             </a:fld>
             <a:endParaRPr lang="da-DK"/>
           </a:p>
@@ -2137,7 +2138,7 @@
           <a:p>
             <a:fld id="{7D0932B6-9F57-4BEA-85B8-88D24CCD4274}" type="datetimeFigureOut">
               <a:rPr lang="da-DK" smtClean="0"/>
-              <a:t>09-11-2017</a:t>
+              <a:t>11-11-2017</a:t>
             </a:fld>
             <a:endParaRPr lang="da-DK"/>
           </a:p>
@@ -2390,7 +2391,7 @@
           <a:p>
             <a:fld id="{7D0932B6-9F57-4BEA-85B8-88D24CCD4274}" type="datetimeFigureOut">
               <a:rPr lang="da-DK" smtClean="0"/>
-              <a:t>09-11-2017</a:t>
+              <a:t>11-11-2017</a:t>
             </a:fld>
             <a:endParaRPr lang="da-DK"/>
           </a:p>
@@ -2603,7 +2604,7 @@
           <a:p>
             <a:fld id="{7D0932B6-9F57-4BEA-85B8-88D24CCD4274}" type="datetimeFigureOut">
               <a:rPr lang="da-DK" smtClean="0"/>
-              <a:t>09-11-2017</a:t>
+              <a:t>11-11-2017</a:t>
             </a:fld>
             <a:endParaRPr lang="da-DK"/>
           </a:p>
@@ -5999,18 +6000,7 @@
                 </a:solidFill>
                 <a:latin typeface="Consolas" panose="020B0609020204030204" pitchFamily="49" charset="0"/>
               </a:rPr>
-              <a:t>   // …</a:t>
-            </a:r>
-            <a:r>
-              <a:rPr lang="da-DK" sz="1200" smtClean="0">
-                <a:solidFill>
-                  <a:schemeClr val="accent6">
-                    <a:lumMod val="75000"/>
-                  </a:schemeClr>
-                </a:solidFill>
-                <a:latin typeface="Consolas" panose="020B0609020204030204" pitchFamily="49" charset="0"/>
-              </a:rPr>
-              <a:t>etc</a:t>
+              <a:t>   // …etc</a:t>
             </a:r>
             <a:endParaRPr lang="da-DK" sz="1200">
               <a:solidFill>
@@ -6253,11 +6243,6 @@
               </a:rPr>
               <a:t>DomainObject</a:t>
             </a:r>
-            <a:endParaRPr lang="da-DK" sz="1600" smtClean="0">
-              <a:solidFill>
-                <a:srgbClr val="FFFF00"/>
-              </a:solidFill>
-            </a:endParaRPr>
           </a:p>
           <a:p>
             <a:r>
@@ -6266,15 +6251,7 @@
                   <a:srgbClr val="FF0000"/>
                 </a:solidFill>
               </a:rPr>
-              <a:t>_</a:t>
-            </a:r>
-            <a:r>
-              <a:rPr lang="da-DK" sz="1600" smtClean="0">
-                <a:solidFill>
-                  <a:srgbClr val="FF0000"/>
-                </a:solidFill>
-              </a:rPr>
-              <a:t>domainObject</a:t>
+              <a:t>_domainObject</a:t>
             </a:r>
           </a:p>
         </p:txBody>
@@ -6900,18 +6877,7 @@
                 </a:solidFill>
                 <a:latin typeface="Consolas" panose="020B0609020204030204" pitchFamily="49" charset="0"/>
               </a:rPr>
-              <a:t>   // …</a:t>
-            </a:r>
-            <a:r>
-              <a:rPr lang="da-DK" sz="1200" smtClean="0">
-                <a:solidFill>
-                  <a:schemeClr val="accent6">
-                    <a:lumMod val="75000"/>
-                  </a:schemeClr>
-                </a:solidFill>
-                <a:latin typeface="Consolas" panose="020B0609020204030204" pitchFamily="49" charset="0"/>
-              </a:rPr>
-              <a:t>etc</a:t>
+              <a:t>   // …etc</a:t>
             </a:r>
             <a:endParaRPr lang="da-DK" sz="1200">
               <a:solidFill>
@@ -11755,8 +11721,8 @@
         </p:nvSpPr>
         <p:spPr>
           <a:xfrm>
-            <a:off x="838200" y="874928"/>
-            <a:ext cx="5884942" cy="2006419"/>
+            <a:off x="838200" y="874929"/>
+            <a:ext cx="5884942" cy="871810"/>
           </a:xfrm>
         </p:spPr>
         <p:txBody>
@@ -11770,18 +11736,13 @@
             </a:pPr>
             <a:r>
               <a:rPr lang="da-DK" b="1" smtClean="0"/>
-              <a:t>[MasterDetailsViewModel]</a:t>
-            </a:r>
-          </a:p>
-          <a:p>
-            <a:pPr marL="0" indent="0">
-              <a:buNone/>
-            </a:pPr>
-            <a:r>
-              <a:rPr lang="da-DK" i="1" smtClean="0"/>
-              <a:t>Det er da ikke så svært…</a:t>
-            </a:r>
-            <a:endParaRPr lang="da-DK" i="1"/>
+              <a:t>[MasterDetailsViewModel</a:t>
+            </a:r>
+            <a:r>
+              <a:rPr lang="da-DK" b="1" smtClean="0"/>
+              <a:t>]</a:t>
+            </a:r>
+            <a:endParaRPr lang="da-DK" b="1" smtClean="0"/>
           </a:p>
         </p:txBody>
       </p:sp>
@@ -11793,8 +11754,8 @@
         </p:nvSpPr>
         <p:spPr>
           <a:xfrm>
-            <a:off x="838200" y="3536641"/>
-            <a:ext cx="5351583" cy="1600438"/>
+            <a:off x="785447" y="2270548"/>
+            <a:ext cx="5351583" cy="2677656"/>
           </a:xfrm>
           <a:prstGeom prst="rect">
             <a:avLst/>
@@ -11953,6 +11914,113 @@
           <a:p>
             <a:r>
               <a:rPr lang="da-DK" sz="1400" smtClean="0">
+                <a:solidFill>
+                  <a:schemeClr val="accent6">
+                    <a:lumMod val="50000"/>
+                  </a:schemeClr>
+                </a:solidFill>
+                <a:latin typeface="Consolas" panose="020B0609020204030204" pitchFamily="49" charset="0"/>
+              </a:rPr>
+              <a:t>   </a:t>
+            </a:r>
+            <a:r>
+              <a:rPr lang="da-DK" sz="1400" smtClean="0">
+                <a:solidFill>
+                  <a:schemeClr val="accent6">
+                    <a:lumMod val="50000"/>
+                  </a:schemeClr>
+                </a:solidFill>
+                <a:latin typeface="Consolas" panose="020B0609020204030204" pitchFamily="49" charset="0"/>
+              </a:rPr>
+              <a:t>}</a:t>
+            </a:r>
+          </a:p>
+          <a:p>
+            <a:r>
+              <a:rPr lang="da-DK" sz="1400" smtClean="0">
+                <a:solidFill>
+                  <a:srgbClr val="0070C0"/>
+                </a:solidFill>
+                <a:latin typeface="Consolas" panose="020B0609020204030204" pitchFamily="49" charset="0"/>
+              </a:rPr>
+              <a:t>   set</a:t>
+            </a:r>
+            <a:endParaRPr lang="da-DK" sz="1400" b="1">
+              <a:solidFill>
+                <a:schemeClr val="accent6">
+                  <a:lumMod val="50000"/>
+                </a:schemeClr>
+              </a:solidFill>
+              <a:latin typeface="Consolas" panose="020B0609020204030204" pitchFamily="49" charset="0"/>
+            </a:endParaRPr>
+          </a:p>
+          <a:p>
+            <a:r>
+              <a:rPr lang="da-DK" sz="1400" b="1">
+                <a:solidFill>
+                  <a:schemeClr val="accent6">
+                    <a:lumMod val="50000"/>
+                  </a:schemeClr>
+                </a:solidFill>
+                <a:latin typeface="Consolas" panose="020B0609020204030204" pitchFamily="49" charset="0"/>
+              </a:rPr>
+              <a:t>   </a:t>
+            </a:r>
+            <a:r>
+              <a:rPr lang="da-DK" sz="1400">
+                <a:solidFill>
+                  <a:schemeClr val="accent6">
+                    <a:lumMod val="50000"/>
+                  </a:schemeClr>
+                </a:solidFill>
+                <a:latin typeface="Consolas" panose="020B0609020204030204" pitchFamily="49" charset="0"/>
+              </a:rPr>
+              <a:t>{</a:t>
+            </a:r>
+          </a:p>
+          <a:p>
+            <a:r>
+              <a:rPr lang="da-DK" sz="1400">
+                <a:latin typeface="Consolas" panose="020B0609020204030204" pitchFamily="49" charset="0"/>
+              </a:rPr>
+              <a:t> </a:t>
+            </a:r>
+            <a:r>
+              <a:rPr lang="da-DK" sz="1400" smtClean="0">
+                <a:latin typeface="Consolas" panose="020B0609020204030204" pitchFamily="49" charset="0"/>
+              </a:rPr>
+              <a:t>     ??? = </a:t>
+            </a:r>
+            <a:r>
+              <a:rPr lang="da-DK" sz="1400">
+                <a:solidFill>
+                  <a:srgbClr val="0070C0"/>
+                </a:solidFill>
+                <a:latin typeface="Consolas" panose="020B0609020204030204" pitchFamily="49" charset="0"/>
+              </a:rPr>
+              <a:t>value</a:t>
+            </a:r>
+            <a:r>
+              <a:rPr lang="da-DK" sz="1400" smtClean="0">
+                <a:latin typeface="Consolas" panose="020B0609020204030204" pitchFamily="49" charset="0"/>
+              </a:rPr>
+              <a:t>;</a:t>
+            </a:r>
+          </a:p>
+          <a:p>
+            <a:r>
+              <a:rPr lang="da-DK" sz="1400" smtClean="0">
+                <a:latin typeface="Consolas" panose="020B0609020204030204" pitchFamily="49" charset="0"/>
+              </a:rPr>
+              <a:t>      OnPropertyChanged();</a:t>
+            </a:r>
+            <a:endParaRPr lang="da-DK" sz="1400">
+              <a:latin typeface="Consolas" panose="020B0609020204030204" pitchFamily="49" charset="0"/>
+            </a:endParaRPr>
+          </a:p>
+          <a:p>
+            <a:r>
+              <a:rPr lang="da-DK" sz="1400">
                 <a:solidFill>
                   <a:schemeClr val="accent6">
                     <a:lumMod val="50000"/>
@@ -12207,8 +12275,8 @@
         </p:nvSpPr>
         <p:spPr>
           <a:xfrm>
-            <a:off x="838200" y="874928"/>
-            <a:ext cx="5884942" cy="2006419"/>
+            <a:off x="838200" y="874929"/>
+            <a:ext cx="5884942" cy="777054"/>
           </a:xfrm>
         </p:spPr>
         <p:txBody>
@@ -12222,218 +12290,13 @@
             </a:pPr>
             <a:r>
               <a:rPr lang="da-DK" b="1" smtClean="0"/>
-              <a:t>[MasterDetailsViewModel]</a:t>
-            </a:r>
-          </a:p>
-          <a:p>
-            <a:pPr marL="0" indent="0">
-              <a:buNone/>
-            </a:pPr>
-            <a:r>
-              <a:rPr lang="da-DK" i="1" smtClean="0"/>
-              <a:t>Det er da ikke så svært…</a:t>
-            </a:r>
-            <a:endParaRPr lang="da-DK" i="1"/>
-          </a:p>
-        </p:txBody>
-      </p:sp>
-      <p:sp>
-        <p:nvSpPr>
-          <p:cNvPr id="7" name="Tekstfelt 6"/>
-          <p:cNvSpPr txBox="1"/>
-          <p:nvPr/>
-        </p:nvSpPr>
-        <p:spPr>
-          <a:xfrm>
-            <a:off x="838200" y="3536641"/>
-            <a:ext cx="5351583" cy="1600438"/>
-          </a:xfrm>
-          <a:prstGeom prst="rect">
-            <a:avLst/>
-          </a:prstGeom>
-          <a:solidFill>
-            <a:schemeClr val="bg1"/>
-          </a:solidFill>
-        </p:spPr>
-        <p:txBody>
-          <a:bodyPr wrap="square" rtlCol="0">
-            <a:spAutoFit/>
-          </a:bodyPr>
-          <a:lstStyle/>
-          <a:p>
-            <a:r>
-              <a:rPr lang="da-DK" sz="1400">
-                <a:solidFill>
-                  <a:srgbClr val="0070C0"/>
-                </a:solidFill>
-                <a:latin typeface="Consolas" panose="020B0609020204030204" pitchFamily="49" charset="0"/>
-              </a:rPr>
-              <a:t>public </a:t>
-            </a:r>
-            <a:r>
-              <a:rPr lang="da-DK" sz="1400" b="1" smtClean="0">
-                <a:solidFill>
-                  <a:schemeClr val="accent6">
-                    <a:lumMod val="75000"/>
-                  </a:schemeClr>
-                </a:solidFill>
-                <a:latin typeface="Consolas" panose="020B0609020204030204" pitchFamily="49" charset="0"/>
-              </a:rPr>
-              <a:t>CarDetailsViewModel</a:t>
-            </a:r>
-            <a:r>
-              <a:rPr lang="da-DK" sz="1400" smtClean="0">
-                <a:solidFill>
-                  <a:schemeClr val="accent6">
-                    <a:lumMod val="50000"/>
-                  </a:schemeClr>
-                </a:solidFill>
-                <a:latin typeface="Consolas" panose="020B0609020204030204" pitchFamily="49" charset="0"/>
-              </a:rPr>
-              <a:t> </a:t>
-            </a:r>
-            <a:r>
-              <a:rPr lang="da-DK" sz="1400" b="1" smtClean="0">
-                <a:solidFill>
-                  <a:schemeClr val="accent6">
-                    <a:lumMod val="50000"/>
-                  </a:schemeClr>
-                </a:solidFill>
-                <a:latin typeface="Consolas" panose="020B0609020204030204" pitchFamily="49" charset="0"/>
-              </a:rPr>
-              <a:t>DetailsViewModel</a:t>
-            </a:r>
-            <a:endParaRPr lang="da-DK" sz="1400" smtClean="0">
-              <a:solidFill>
-                <a:schemeClr val="accent6">
-                  <a:lumMod val="50000"/>
-                </a:schemeClr>
-              </a:solidFill>
-              <a:latin typeface="Consolas" panose="020B0609020204030204" pitchFamily="49" charset="0"/>
-            </a:endParaRPr>
-          </a:p>
-          <a:p>
-            <a:r>
-              <a:rPr lang="da-DK" sz="1400" smtClean="0">
-                <a:latin typeface="Consolas" panose="020B0609020204030204" pitchFamily="49" charset="0"/>
-              </a:rPr>
-              <a:t>{</a:t>
-            </a:r>
-          </a:p>
-          <a:p>
-            <a:r>
-              <a:rPr lang="da-DK" sz="1400" smtClean="0">
-                <a:solidFill>
-                  <a:srgbClr val="0070C0"/>
-                </a:solidFill>
-                <a:latin typeface="Consolas" panose="020B0609020204030204" pitchFamily="49" charset="0"/>
-              </a:rPr>
-              <a:t>   get</a:t>
-            </a:r>
-            <a:endParaRPr lang="da-DK" sz="1400" b="1" smtClean="0">
-              <a:solidFill>
-                <a:schemeClr val="accent6">
-                  <a:lumMod val="50000"/>
-                </a:schemeClr>
-              </a:solidFill>
-              <a:latin typeface="Consolas" panose="020B0609020204030204" pitchFamily="49" charset="0"/>
-            </a:endParaRPr>
-          </a:p>
-          <a:p>
-            <a:r>
-              <a:rPr lang="da-DK" sz="1400" b="1">
-                <a:solidFill>
-                  <a:schemeClr val="accent6">
-                    <a:lumMod val="50000"/>
-                  </a:schemeClr>
-                </a:solidFill>
-                <a:latin typeface="Consolas" panose="020B0609020204030204" pitchFamily="49" charset="0"/>
-              </a:rPr>
-              <a:t> </a:t>
-            </a:r>
-            <a:r>
-              <a:rPr lang="da-DK" sz="1400" b="1" smtClean="0">
-                <a:solidFill>
-                  <a:schemeClr val="accent6">
-                    <a:lumMod val="50000"/>
-                  </a:schemeClr>
-                </a:solidFill>
-                <a:latin typeface="Consolas" panose="020B0609020204030204" pitchFamily="49" charset="0"/>
-              </a:rPr>
-              <a:t>  </a:t>
-            </a:r>
-            <a:r>
-              <a:rPr lang="da-DK" sz="1400" smtClean="0">
-                <a:solidFill>
-                  <a:schemeClr val="accent6">
-                    <a:lumMod val="50000"/>
-                  </a:schemeClr>
-                </a:solidFill>
-                <a:latin typeface="Consolas" panose="020B0609020204030204" pitchFamily="49" charset="0"/>
-              </a:rPr>
-              <a:t>{</a:t>
-            </a:r>
-          </a:p>
-          <a:p>
-            <a:r>
-              <a:rPr lang="da-DK" sz="1400" smtClean="0">
-                <a:solidFill>
-                  <a:schemeClr val="accent6">
-                    <a:lumMod val="50000"/>
-                  </a:schemeClr>
-                </a:solidFill>
-                <a:latin typeface="Consolas" panose="020B0609020204030204" pitchFamily="49" charset="0"/>
-              </a:rPr>
-              <a:t>      </a:t>
-            </a:r>
-            <a:r>
-              <a:rPr lang="da-DK" sz="1400" smtClean="0">
-                <a:solidFill>
-                  <a:srgbClr val="0070C0"/>
-                </a:solidFill>
-                <a:latin typeface="Consolas" panose="020B0609020204030204" pitchFamily="49" charset="0"/>
-              </a:rPr>
-              <a:t>return </a:t>
-            </a:r>
-            <a:r>
-              <a:rPr lang="da-DK" sz="1400" smtClean="0">
-                <a:solidFill>
-                  <a:srgbClr val="FF0000"/>
-                </a:solidFill>
-                <a:latin typeface="Consolas" panose="020B0609020204030204" pitchFamily="49" charset="0"/>
-              </a:rPr>
-              <a:t>_detailsViewModel</a:t>
-            </a:r>
-            <a:r>
-              <a:rPr lang="da-DK" sz="1400" smtClean="0">
-                <a:latin typeface="Consolas" panose="020B0609020204030204" pitchFamily="49" charset="0"/>
-              </a:rPr>
-              <a:t>;</a:t>
-            </a:r>
-          </a:p>
-          <a:p>
-            <a:r>
-              <a:rPr lang="da-DK" sz="1400" smtClean="0">
-                <a:solidFill>
-                  <a:schemeClr val="accent6">
-                    <a:lumMod val="50000"/>
-                  </a:schemeClr>
-                </a:solidFill>
-                <a:latin typeface="Consolas" panose="020B0609020204030204" pitchFamily="49" charset="0"/>
-              </a:rPr>
-              <a:t>   }</a:t>
-            </a:r>
-            <a:endParaRPr lang="da-DK" sz="1400">
-              <a:latin typeface="Consolas" panose="020B0609020204030204" pitchFamily="49" charset="0"/>
-            </a:endParaRPr>
-          </a:p>
-          <a:p>
-            <a:r>
-              <a:rPr lang="da-DK" sz="1400" smtClean="0">
-                <a:latin typeface="Consolas" panose="020B0609020204030204" pitchFamily="49" charset="0"/>
-              </a:rPr>
-              <a:t>}</a:t>
-            </a:r>
+              <a:t>[MasterDetailsViewModel</a:t>
+            </a:r>
+            <a:r>
+              <a:rPr lang="da-DK" b="1" smtClean="0"/>
+              <a:t>]</a:t>
+            </a:r>
+            <a:endParaRPr lang="da-DK" b="1" smtClean="0"/>
           </a:p>
         </p:txBody>
       </p:sp>
@@ -12665,6 +12528,349 @@
                 </a:solidFill>
               </a:rPr>
               <a:t>_detailsViewModel</a:t>
+            </a:r>
+          </a:p>
+        </p:txBody>
+      </p:sp>
+      <p:sp>
+        <p:nvSpPr>
+          <p:cNvPr id="11" name="Tekstfelt 10"/>
+          <p:cNvSpPr txBox="1"/>
+          <p:nvPr/>
+        </p:nvSpPr>
+        <p:spPr>
+          <a:xfrm>
+            <a:off x="785447" y="2270548"/>
+            <a:ext cx="5351583" cy="2677656"/>
+          </a:xfrm>
+          <a:prstGeom prst="rect">
+            <a:avLst/>
+          </a:prstGeom>
+          <a:solidFill>
+            <a:schemeClr val="bg1"/>
+          </a:solidFill>
+        </p:spPr>
+        <p:txBody>
+          <a:bodyPr wrap="square" rtlCol="0">
+            <a:spAutoFit/>
+          </a:bodyPr>
+          <a:lstStyle/>
+          <a:p>
+            <a:r>
+              <a:rPr lang="da-DK" sz="1400">
+                <a:solidFill>
+                  <a:srgbClr val="0070C0"/>
+                </a:solidFill>
+                <a:latin typeface="Consolas" panose="020B0609020204030204" pitchFamily="49" charset="0"/>
+              </a:rPr>
+              <a:t>public </a:t>
+            </a:r>
+            <a:r>
+              <a:rPr lang="da-DK" sz="1400" b="1" smtClean="0">
+                <a:solidFill>
+                  <a:schemeClr val="accent6">
+                    <a:lumMod val="75000"/>
+                  </a:schemeClr>
+                </a:solidFill>
+                <a:latin typeface="Consolas" panose="020B0609020204030204" pitchFamily="49" charset="0"/>
+              </a:rPr>
+              <a:t>CarDetailsViewModel</a:t>
+            </a:r>
+            <a:r>
+              <a:rPr lang="da-DK" sz="1400" smtClean="0">
+                <a:solidFill>
+                  <a:schemeClr val="accent6">
+                    <a:lumMod val="50000"/>
+                  </a:schemeClr>
+                </a:solidFill>
+                <a:latin typeface="Consolas" panose="020B0609020204030204" pitchFamily="49" charset="0"/>
+              </a:rPr>
+              <a:t> </a:t>
+            </a:r>
+            <a:r>
+              <a:rPr lang="da-DK" sz="1400" b="1" smtClean="0">
+                <a:solidFill>
+                  <a:schemeClr val="accent6">
+                    <a:lumMod val="50000"/>
+                  </a:schemeClr>
+                </a:solidFill>
+                <a:latin typeface="Consolas" panose="020B0609020204030204" pitchFamily="49" charset="0"/>
+              </a:rPr>
+              <a:t>DetailsViewModel</a:t>
+            </a:r>
+            <a:endParaRPr lang="da-DK" sz="1400" smtClean="0">
+              <a:solidFill>
+                <a:schemeClr val="accent6">
+                  <a:lumMod val="50000"/>
+                </a:schemeClr>
+              </a:solidFill>
+              <a:latin typeface="Consolas" panose="020B0609020204030204" pitchFamily="49" charset="0"/>
+            </a:endParaRPr>
+          </a:p>
+          <a:p>
+            <a:r>
+              <a:rPr lang="da-DK" sz="1400" smtClean="0">
+                <a:latin typeface="Consolas" panose="020B0609020204030204" pitchFamily="49" charset="0"/>
+              </a:rPr>
+              <a:t>{</a:t>
+            </a:r>
+          </a:p>
+          <a:p>
+            <a:r>
+              <a:rPr lang="da-DK" sz="1400" smtClean="0">
+                <a:solidFill>
+                  <a:srgbClr val="0070C0"/>
+                </a:solidFill>
+                <a:latin typeface="Consolas" panose="020B0609020204030204" pitchFamily="49" charset="0"/>
+              </a:rPr>
+              <a:t>   get</a:t>
+            </a:r>
+            <a:endParaRPr lang="da-DK" sz="1400" b="1" smtClean="0">
+              <a:solidFill>
+                <a:schemeClr val="accent6">
+                  <a:lumMod val="50000"/>
+                </a:schemeClr>
+              </a:solidFill>
+              <a:latin typeface="Consolas" panose="020B0609020204030204" pitchFamily="49" charset="0"/>
+            </a:endParaRPr>
+          </a:p>
+          <a:p>
+            <a:r>
+              <a:rPr lang="da-DK" sz="1400" b="1">
+                <a:solidFill>
+                  <a:schemeClr val="accent6">
+                    <a:lumMod val="50000"/>
+                  </a:schemeClr>
+                </a:solidFill>
+                <a:latin typeface="Consolas" panose="020B0609020204030204" pitchFamily="49" charset="0"/>
+              </a:rPr>
+              <a:t> </a:t>
+            </a:r>
+            <a:r>
+              <a:rPr lang="da-DK" sz="1400" b="1" smtClean="0">
+                <a:solidFill>
+                  <a:schemeClr val="accent6">
+                    <a:lumMod val="50000"/>
+                  </a:schemeClr>
+                </a:solidFill>
+                <a:latin typeface="Consolas" panose="020B0609020204030204" pitchFamily="49" charset="0"/>
+              </a:rPr>
+              <a:t>  </a:t>
+            </a:r>
+            <a:r>
+              <a:rPr lang="da-DK" sz="1400" smtClean="0">
+                <a:solidFill>
+                  <a:schemeClr val="accent6">
+                    <a:lumMod val="50000"/>
+                  </a:schemeClr>
+                </a:solidFill>
+                <a:latin typeface="Consolas" panose="020B0609020204030204" pitchFamily="49" charset="0"/>
+              </a:rPr>
+              <a:t>{</a:t>
+            </a:r>
+          </a:p>
+          <a:p>
+            <a:r>
+              <a:rPr lang="da-DK" sz="1400" smtClean="0">
+                <a:solidFill>
+                  <a:schemeClr val="accent6">
+                    <a:lumMod val="50000"/>
+                  </a:schemeClr>
+                </a:solidFill>
+                <a:latin typeface="Consolas" panose="020B0609020204030204" pitchFamily="49" charset="0"/>
+              </a:rPr>
+              <a:t>      </a:t>
+            </a:r>
+            <a:r>
+              <a:rPr lang="da-DK" sz="1400" smtClean="0">
+                <a:solidFill>
+                  <a:srgbClr val="0070C0"/>
+                </a:solidFill>
+                <a:latin typeface="Consolas" panose="020B0609020204030204" pitchFamily="49" charset="0"/>
+              </a:rPr>
+              <a:t>return </a:t>
+            </a:r>
+            <a:r>
+              <a:rPr lang="da-DK" sz="1400" smtClean="0">
+                <a:solidFill>
+                  <a:srgbClr val="FF0000"/>
+                </a:solidFill>
+                <a:latin typeface="Consolas" panose="020B0609020204030204" pitchFamily="49" charset="0"/>
+              </a:rPr>
+              <a:t>_detailsViewModel</a:t>
+            </a:r>
+            <a:r>
+              <a:rPr lang="da-DK" sz="1400" smtClean="0">
+                <a:latin typeface="Consolas" panose="020B0609020204030204" pitchFamily="49" charset="0"/>
+              </a:rPr>
+              <a:t>;</a:t>
+            </a:r>
+            <a:endParaRPr lang="da-DK" sz="1400" smtClean="0">
+              <a:latin typeface="Consolas" panose="020B0609020204030204" pitchFamily="49" charset="0"/>
+            </a:endParaRPr>
+          </a:p>
+          <a:p>
+            <a:r>
+              <a:rPr lang="da-DK" sz="1400" smtClean="0">
+                <a:solidFill>
+                  <a:schemeClr val="accent6">
+                    <a:lumMod val="50000"/>
+                  </a:schemeClr>
+                </a:solidFill>
+                <a:latin typeface="Consolas" panose="020B0609020204030204" pitchFamily="49" charset="0"/>
+              </a:rPr>
+              <a:t>   </a:t>
+            </a:r>
+            <a:r>
+              <a:rPr lang="da-DK" sz="1400" smtClean="0">
+                <a:solidFill>
+                  <a:schemeClr val="accent6">
+                    <a:lumMod val="50000"/>
+                  </a:schemeClr>
+                </a:solidFill>
+                <a:latin typeface="Consolas" panose="020B0609020204030204" pitchFamily="49" charset="0"/>
+              </a:rPr>
+              <a:t>}</a:t>
+            </a:r>
+          </a:p>
+          <a:p>
+            <a:r>
+              <a:rPr lang="da-DK" sz="1400" smtClean="0">
+                <a:solidFill>
+                  <a:srgbClr val="0070C0"/>
+                </a:solidFill>
+                <a:latin typeface="Consolas" panose="020B0609020204030204" pitchFamily="49" charset="0"/>
+              </a:rPr>
+              <a:t>   set</a:t>
+            </a:r>
+            <a:endParaRPr lang="da-DK" sz="1400" b="1">
+              <a:solidFill>
+                <a:schemeClr val="accent6">
+                  <a:lumMod val="50000"/>
+                </a:schemeClr>
+              </a:solidFill>
+              <a:latin typeface="Consolas" panose="020B0609020204030204" pitchFamily="49" charset="0"/>
+            </a:endParaRPr>
+          </a:p>
+          <a:p>
+            <a:r>
+              <a:rPr lang="da-DK" sz="1400" b="1">
+                <a:solidFill>
+                  <a:schemeClr val="accent6">
+                    <a:lumMod val="50000"/>
+                  </a:schemeClr>
+                </a:solidFill>
+                <a:latin typeface="Consolas" panose="020B0609020204030204" pitchFamily="49" charset="0"/>
+              </a:rPr>
+              <a:t>   </a:t>
+            </a:r>
+            <a:r>
+              <a:rPr lang="da-DK" sz="1400">
+                <a:solidFill>
+                  <a:schemeClr val="accent6">
+                    <a:lumMod val="50000"/>
+                  </a:schemeClr>
+                </a:solidFill>
+                <a:latin typeface="Consolas" panose="020B0609020204030204" pitchFamily="49" charset="0"/>
+              </a:rPr>
+              <a:t>{</a:t>
+            </a:r>
+          </a:p>
+          <a:p>
+            <a:r>
+              <a:rPr lang="da-DK" sz="1400">
+                <a:latin typeface="Consolas" panose="020B0609020204030204" pitchFamily="49" charset="0"/>
+              </a:rPr>
+              <a:t> </a:t>
+            </a:r>
+            <a:r>
+              <a:rPr lang="da-DK" sz="1400" smtClean="0">
+                <a:latin typeface="Consolas" panose="020B0609020204030204" pitchFamily="49" charset="0"/>
+              </a:rPr>
+              <a:t>     </a:t>
+            </a:r>
+            <a:r>
+              <a:rPr lang="da-DK" sz="1400" smtClean="0">
+                <a:solidFill>
+                  <a:srgbClr val="FF0000"/>
+                </a:solidFill>
+                <a:latin typeface="Consolas" panose="020B0609020204030204" pitchFamily="49" charset="0"/>
+              </a:rPr>
+              <a:t>_</a:t>
+            </a:r>
+            <a:r>
+              <a:rPr lang="da-DK" sz="1400">
+                <a:solidFill>
+                  <a:srgbClr val="FF0000"/>
+                </a:solidFill>
+                <a:latin typeface="Consolas" panose="020B0609020204030204" pitchFamily="49" charset="0"/>
+              </a:rPr>
+              <a:t>detailsViewModel</a:t>
+            </a:r>
+            <a:r>
+              <a:rPr lang="da-DK" sz="1400" smtClean="0">
+                <a:solidFill>
+                  <a:srgbClr val="FF0000"/>
+                </a:solidFill>
+                <a:latin typeface="Consolas" panose="020B0609020204030204" pitchFamily="49" charset="0"/>
+              </a:rPr>
+              <a:t> </a:t>
+            </a:r>
+            <a:r>
+              <a:rPr lang="da-DK" sz="1400" smtClean="0">
+                <a:latin typeface="Consolas" panose="020B0609020204030204" pitchFamily="49" charset="0"/>
+              </a:rPr>
+              <a:t>= </a:t>
+            </a:r>
+            <a:r>
+              <a:rPr lang="da-DK" sz="1400">
+                <a:solidFill>
+                  <a:srgbClr val="0070C0"/>
+                </a:solidFill>
+                <a:latin typeface="Consolas" panose="020B0609020204030204" pitchFamily="49" charset="0"/>
+              </a:rPr>
+              <a:t>value</a:t>
+            </a:r>
+            <a:r>
+              <a:rPr lang="da-DK" sz="1400" smtClean="0">
+                <a:latin typeface="Consolas" panose="020B0609020204030204" pitchFamily="49" charset="0"/>
+              </a:rPr>
+              <a:t>;</a:t>
+            </a:r>
+          </a:p>
+          <a:p>
+            <a:r>
+              <a:rPr lang="da-DK" sz="1400" smtClean="0">
+                <a:latin typeface="Consolas" panose="020B0609020204030204" pitchFamily="49" charset="0"/>
+              </a:rPr>
+              <a:t>      OnPropertyChanged();</a:t>
+            </a:r>
+            <a:endParaRPr lang="da-DK" sz="1400">
+              <a:latin typeface="Consolas" panose="020B0609020204030204" pitchFamily="49" charset="0"/>
+            </a:endParaRPr>
+          </a:p>
+          <a:p>
+            <a:r>
+              <a:rPr lang="da-DK" sz="1400">
+                <a:solidFill>
+                  <a:schemeClr val="accent6">
+                    <a:lumMod val="50000"/>
+                  </a:schemeClr>
+                </a:solidFill>
+                <a:latin typeface="Consolas" panose="020B0609020204030204" pitchFamily="49" charset="0"/>
+              </a:rPr>
+              <a:t>   }</a:t>
+            </a:r>
+            <a:endParaRPr lang="da-DK" sz="1400">
+              <a:latin typeface="Consolas" panose="020B0609020204030204" pitchFamily="49" charset="0"/>
+            </a:endParaRPr>
+          </a:p>
+          <a:p>
+            <a:r>
+              <a:rPr lang="da-DK" sz="1400" smtClean="0">
+                <a:latin typeface="Consolas" panose="020B0609020204030204" pitchFamily="49" charset="0"/>
+              </a:rPr>
+              <a:t>}</a:t>
             </a:r>
           </a:p>
         </p:txBody>
@@ -15954,19 +16160,7 @@
               <a:rPr lang="da-DK" sz="1400" smtClean="0">
                 <a:latin typeface="Consolas" panose="020B0609020204030204" pitchFamily="49" charset="0"/>
               </a:rPr>
-              <a:t>     </a:t>
-            </a:r>
-            <a:r>
-              <a:rPr lang="da-DK" sz="1400" b="1" smtClean="0">
-                <a:latin typeface="Consolas" panose="020B0609020204030204" pitchFamily="49" charset="0"/>
-              </a:rPr>
-              <a:t>OnPropertyChanged</a:t>
-            </a:r>
-            <a:r>
-              <a:rPr lang="da-DK" sz="1400" smtClean="0">
-                <a:latin typeface="Consolas" panose="020B0609020204030204" pitchFamily="49" charset="0"/>
-              </a:rPr>
-              <a:t>();</a:t>
+              <a:t>     OnPropertyChanged();</a:t>
             </a:r>
           </a:p>
           <a:p>
@@ -17191,19 +17385,7 @@
               <a:rPr lang="da-DK" sz="1400" smtClean="0">
                 <a:latin typeface="Consolas" panose="020B0609020204030204" pitchFamily="49" charset="0"/>
               </a:rPr>
-              <a:t>     </a:t>
-            </a:r>
-            <a:r>
-              <a:rPr lang="da-DK" sz="1400" b="1" smtClean="0">
-                <a:latin typeface="Consolas" panose="020B0609020204030204" pitchFamily="49" charset="0"/>
-              </a:rPr>
-              <a:t>OnPropertyChanged</a:t>
-            </a:r>
-            <a:r>
-              <a:rPr lang="da-DK" sz="1400" smtClean="0">
-                <a:latin typeface="Consolas" panose="020B0609020204030204" pitchFamily="49" charset="0"/>
-              </a:rPr>
-              <a:t>();</a:t>
+              <a:t>     OnPropertyChanged();</a:t>
             </a:r>
           </a:p>
           <a:p>
@@ -18337,19 +18519,7 @@
               <a:rPr lang="da-DK" sz="1400" smtClean="0">
                 <a:latin typeface="Consolas" panose="020B0609020204030204" pitchFamily="49" charset="0"/>
               </a:rPr>
-              <a:t>     </a:t>
-            </a:r>
-            <a:r>
-              <a:rPr lang="da-DK" sz="1400" b="1" smtClean="0">
-                <a:latin typeface="Consolas" panose="020B0609020204030204" pitchFamily="49" charset="0"/>
-              </a:rPr>
-              <a:t>OnPropertyChanged</a:t>
-            </a:r>
-            <a:r>
-              <a:rPr lang="da-DK" sz="1400" smtClean="0">
-                <a:latin typeface="Consolas" panose="020B0609020204030204" pitchFamily="49" charset="0"/>
-              </a:rPr>
-              <a:t>();</a:t>
+              <a:t>     OnPropertyChanged();</a:t>
             </a:r>
           </a:p>
           <a:p>
@@ -18734,7 +18904,7 @@
         <p:spPr>
           <a:xfrm>
             <a:off x="654004" y="553399"/>
-            <a:ext cx="10680610" cy="4524315"/>
+            <a:ext cx="10680610" cy="4308872"/>
           </a:xfrm>
           <a:prstGeom prst="rect">
             <a:avLst/>
@@ -18972,13 +19142,25 @@
               <a:rPr lang="da-DK" sz="1400" smtClean="0">
                 <a:latin typeface="Consolas" panose="020B0609020204030204" pitchFamily="49" charset="0"/>
               </a:rPr>
-              <a:t>         _</a:t>
+              <a:t>         </a:t>
             </a:r>
             <a:r>
               <a:rPr lang="da-DK" sz="1400">
                 <a:latin typeface="Consolas" panose="020B0609020204030204" pitchFamily="49" charset="0"/>
               </a:rPr>
-              <a:t>detailsViewModel = </a:t>
+              <a:t>D</a:t>
+            </a:r>
+            <a:r>
+              <a:rPr lang="da-DK" sz="1400" smtClean="0">
+                <a:latin typeface="Consolas" panose="020B0609020204030204" pitchFamily="49" charset="0"/>
+              </a:rPr>
+              <a:t>etailsViewModel </a:t>
+            </a:r>
+            <a:r>
+              <a:rPr lang="da-DK" sz="1400">
+                <a:latin typeface="Consolas" panose="020B0609020204030204" pitchFamily="49" charset="0"/>
+              </a:rPr>
+              <a:t>= </a:t>
             </a:r>
             <a:r>
               <a:rPr lang="da-DK" sz="1400">
@@ -19075,13 +19257,25 @@
               <a:rPr lang="da-DK" sz="1400" smtClean="0">
                 <a:latin typeface="Consolas" panose="020B0609020204030204" pitchFamily="49" charset="0"/>
               </a:rPr>
-              <a:t>         _</a:t>
+              <a:t>         </a:t>
             </a:r>
             <a:r>
               <a:rPr lang="da-DK" sz="1400">
                 <a:latin typeface="Consolas" panose="020B0609020204030204" pitchFamily="49" charset="0"/>
               </a:rPr>
-              <a:t>detailsViewModel = </a:t>
+              <a:t>D</a:t>
+            </a:r>
+            <a:r>
+              <a:rPr lang="da-DK" sz="1400" smtClean="0">
+                <a:latin typeface="Consolas" panose="020B0609020204030204" pitchFamily="49" charset="0"/>
+              </a:rPr>
+              <a:t>etailsViewModel </a:t>
+            </a:r>
+            <a:r>
+              <a:rPr lang="da-DK" sz="1400">
+                <a:latin typeface="Consolas" panose="020B0609020204030204" pitchFamily="49" charset="0"/>
+              </a:rPr>
+              <a:t>= </a:t>
             </a:r>
             <a:r>
               <a:rPr lang="da-DK" sz="1400">
@@ -19126,67 +19320,17 @@
               <a:rPr lang="da-DK" sz="1400" smtClean="0">
                 <a:latin typeface="Consolas" panose="020B0609020204030204" pitchFamily="49" charset="0"/>
               </a:rPr>
-              <a:t>     </a:t>
-            </a:r>
-            <a:r>
-              <a:rPr lang="da-DK" sz="1400" b="1" smtClean="0">
-                <a:latin typeface="Consolas" panose="020B0609020204030204" pitchFamily="49" charset="0"/>
-              </a:rPr>
-              <a:t>OnPropertyChanged</a:t>
-            </a:r>
-            <a:r>
-              <a:rPr lang="da-DK" sz="1400">
+              <a:t>     OnPropertyChanged</a:t>
+            </a:r>
+            <a:r>
+              <a:rPr lang="da-DK" sz="1400" smtClean="0">
                 <a:latin typeface="Consolas" panose="020B0609020204030204" pitchFamily="49" charset="0"/>
               </a:rPr>
               <a:t>();</a:t>
             </a:r>
-          </a:p>
-          <a:p>
-            <a:r>
-              <a:rPr lang="da-DK" sz="1400" smtClean="0">
-                <a:latin typeface="Consolas" panose="020B0609020204030204" pitchFamily="49" charset="0"/>
-              </a:rPr>
-              <a:t>      </a:t>
-            </a:r>
-            <a:r>
-              <a:rPr lang="da-DK" sz="1400" b="1" smtClean="0">
-                <a:latin typeface="Consolas" panose="020B0609020204030204" pitchFamily="49" charset="0"/>
-              </a:rPr>
-              <a:t>OnPropertyChanged</a:t>
-            </a:r>
-            <a:r>
-              <a:rPr lang="da-DK" sz="1400" smtClean="0">
-                <a:latin typeface="Consolas" panose="020B0609020204030204" pitchFamily="49" charset="0"/>
-              </a:rPr>
-              <a:t>(</a:t>
-            </a:r>
-            <a:r>
-              <a:rPr lang="da-DK" sz="1400">
-                <a:solidFill>
-                  <a:srgbClr val="0070C0"/>
-                </a:solidFill>
-                <a:latin typeface="Consolas" panose="020B0609020204030204" pitchFamily="49" charset="0"/>
-              </a:rPr>
-              <a:t>nameof</a:t>
-            </a:r>
-            <a:r>
-              <a:rPr lang="da-DK" sz="1400" smtClean="0">
-                <a:latin typeface="Consolas" panose="020B0609020204030204" pitchFamily="49" charset="0"/>
-              </a:rPr>
-              <a:t>(</a:t>
-            </a:r>
-            <a:r>
-              <a:rPr lang="da-DK" sz="1400" b="1" smtClean="0">
-                <a:latin typeface="Consolas" panose="020B0609020204030204" pitchFamily="49" charset="0"/>
-              </a:rPr>
-              <a:t>DetailsViewModel</a:t>
-            </a:r>
-            <a:r>
-              <a:rPr lang="da-DK" sz="1400">
-                <a:latin typeface="Consolas" panose="020B0609020204030204" pitchFamily="49" charset="0"/>
-              </a:rPr>
-              <a:t>));</a:t>
-            </a:r>
+            <a:endParaRPr lang="da-DK" sz="1400">
+              <a:latin typeface="Consolas" panose="020B0609020204030204" pitchFamily="49" charset="0"/>
+            </a:endParaRPr>
           </a:p>
           <a:p>
             <a:r>
@@ -19286,16 +19430,22 @@
           <a:lstStyle/>
           <a:p>
             <a:r>
+              <a:rPr lang="da-DK">
+                <a:latin typeface="Consolas" panose="020B0609020204030204" pitchFamily="49" charset="0"/>
+              </a:rPr>
+              <a:t>D</a:t>
+            </a:r>
+            <a:r>
               <a:rPr lang="da-DK" smtClean="0">
                 <a:latin typeface="Consolas" panose="020B0609020204030204" pitchFamily="49" charset="0"/>
               </a:rPr>
-              <a:t>_</a:t>
+              <a:t>etailsViewModel </a:t>
             </a:r>
             <a:r>
               <a:rPr lang="da-DK">
                 <a:latin typeface="Consolas" panose="020B0609020204030204" pitchFamily="49" charset="0"/>
               </a:rPr>
-              <a:t>detailsViewModel = </a:t>
+              <a:t>= </a:t>
             </a:r>
             <a:r>
               <a:rPr lang="da-DK">
@@ -19698,16 +19848,22 @@
           <a:lstStyle/>
           <a:p>
             <a:r>
+              <a:rPr lang="da-DK">
+                <a:latin typeface="Consolas" panose="020B0609020204030204" pitchFamily="49" charset="0"/>
+              </a:rPr>
+              <a:t>D</a:t>
+            </a:r>
+            <a:r>
               <a:rPr lang="da-DK" smtClean="0">
                 <a:latin typeface="Consolas" panose="020B0609020204030204" pitchFamily="49" charset="0"/>
               </a:rPr>
-              <a:t>_</a:t>
+              <a:t>etailsViewModel </a:t>
             </a:r>
             <a:r>
               <a:rPr lang="da-DK">
                 <a:latin typeface="Consolas" panose="020B0609020204030204" pitchFamily="49" charset="0"/>
               </a:rPr>
-              <a:t>detailsViewModel = </a:t>
+              <a:t>= </a:t>
             </a:r>
             <a:r>
               <a:rPr lang="da-DK">
@@ -20037,16 +20193,22 @@
           <a:lstStyle/>
           <a:p>
             <a:r>
+              <a:rPr lang="da-DK">
+                <a:latin typeface="Consolas" panose="020B0609020204030204" pitchFamily="49" charset="0"/>
+              </a:rPr>
+              <a:t>D</a:t>
+            </a:r>
+            <a:r>
               <a:rPr lang="da-DK" smtClean="0">
                 <a:latin typeface="Consolas" panose="020B0609020204030204" pitchFamily="49" charset="0"/>
               </a:rPr>
-              <a:t>_</a:t>
+              <a:t>etailsViewModel </a:t>
             </a:r>
             <a:r>
               <a:rPr lang="da-DK">
                 <a:latin typeface="Consolas" panose="020B0609020204030204" pitchFamily="49" charset="0"/>
               </a:rPr>
-              <a:t>detailsViewModel = </a:t>
+              <a:t>= </a:t>
             </a:r>
             <a:r>
               <a:rPr lang="da-DK">
@@ -20428,16 +20590,22 @@
           <a:lstStyle/>
           <a:p>
             <a:r>
+              <a:rPr lang="da-DK">
+                <a:latin typeface="Consolas" panose="020B0609020204030204" pitchFamily="49" charset="0"/>
+              </a:rPr>
+              <a:t>D</a:t>
+            </a:r>
+            <a:r>
               <a:rPr lang="da-DK" smtClean="0">
                 <a:latin typeface="Consolas" panose="020B0609020204030204" pitchFamily="49" charset="0"/>
               </a:rPr>
-              <a:t>_</a:t>
+              <a:t>etailsViewModel </a:t>
             </a:r>
             <a:r>
               <a:rPr lang="da-DK">
                 <a:latin typeface="Consolas" panose="020B0609020204030204" pitchFamily="49" charset="0"/>
               </a:rPr>
-              <a:t>detailsViewModel = </a:t>
+              <a:t>= </a:t>
             </a:r>
             <a:r>
               <a:rPr lang="da-DK">
@@ -21089,28 +21257,34 @@
           <a:lstStyle/>
           <a:p>
             <a:r>
+              <a:rPr lang="da-DK">
+                <a:solidFill>
+                  <a:srgbClr val="FF0000"/>
+                </a:solidFill>
+                <a:latin typeface="Consolas" panose="020B0609020204030204" pitchFamily="49" charset="0"/>
+              </a:rPr>
+              <a:t>D</a:t>
+            </a:r>
+            <a:r>
               <a:rPr lang="da-DK" smtClean="0">
                 <a:solidFill>
                   <a:srgbClr val="FF0000"/>
                 </a:solidFill>
                 <a:latin typeface="Consolas" panose="020B0609020204030204" pitchFamily="49" charset="0"/>
               </a:rPr>
-              <a:t>_</a:t>
+              <a:t>etailsViewModel</a:t>
+            </a:r>
+            <a:r>
+              <a:rPr lang="da-DK" smtClean="0">
+                <a:latin typeface="Consolas" panose="020B0609020204030204" pitchFamily="49" charset="0"/>
+              </a:rPr>
+              <a:t> </a:t>
             </a:r>
             <a:r>
               <a:rPr lang="da-DK">
-                <a:solidFill>
-                  <a:srgbClr val="FF0000"/>
-                </a:solidFill>
-                <a:latin typeface="Consolas" panose="020B0609020204030204" pitchFamily="49" charset="0"/>
-              </a:rPr>
-              <a:t>detailsViewModel</a:t>
-            </a:r>
-            <a:r>
-              <a:rPr lang="da-DK">
-                <a:latin typeface="Consolas" panose="020B0609020204030204" pitchFamily="49" charset="0"/>
-              </a:rPr>
-              <a:t> = </a:t>
+                <a:latin typeface="Consolas" panose="020B0609020204030204" pitchFamily="49" charset="0"/>
+              </a:rPr>
+              <a:t>= </a:t>
             </a:r>
             <a:r>
               <a:rPr lang="da-DK">
@@ -21651,7 +21825,7 @@
         <p:spPr>
           <a:xfrm>
             <a:off x="654004" y="553399"/>
-            <a:ext cx="10680610" cy="4524315"/>
+            <a:ext cx="10680610" cy="4308872"/>
           </a:xfrm>
           <a:prstGeom prst="rect">
             <a:avLst/>
@@ -21889,13 +22063,25 @@
               <a:rPr lang="da-DK" sz="1400" smtClean="0">
                 <a:latin typeface="Consolas" panose="020B0609020204030204" pitchFamily="49" charset="0"/>
               </a:rPr>
-              <a:t>         _</a:t>
+              <a:t>         </a:t>
             </a:r>
             <a:r>
               <a:rPr lang="da-DK" sz="1400">
                 <a:latin typeface="Consolas" panose="020B0609020204030204" pitchFamily="49" charset="0"/>
               </a:rPr>
-              <a:t>detailsViewModel = </a:t>
+              <a:t>D</a:t>
+            </a:r>
+            <a:r>
+              <a:rPr lang="da-DK" sz="1400" smtClean="0">
+                <a:latin typeface="Consolas" panose="020B0609020204030204" pitchFamily="49" charset="0"/>
+              </a:rPr>
+              <a:t>etailsViewModel </a:t>
+            </a:r>
+            <a:r>
+              <a:rPr lang="da-DK" sz="1400">
+                <a:latin typeface="Consolas" panose="020B0609020204030204" pitchFamily="49" charset="0"/>
+              </a:rPr>
+              <a:t>= </a:t>
             </a:r>
             <a:r>
               <a:rPr lang="da-DK" sz="1400">
@@ -21992,13 +22178,25 @@
               <a:rPr lang="da-DK" sz="1400" smtClean="0">
                 <a:latin typeface="Consolas" panose="020B0609020204030204" pitchFamily="49" charset="0"/>
               </a:rPr>
-              <a:t>         _</a:t>
+              <a:t>         </a:t>
             </a:r>
             <a:r>
               <a:rPr lang="da-DK" sz="1400">
                 <a:latin typeface="Consolas" panose="020B0609020204030204" pitchFamily="49" charset="0"/>
               </a:rPr>
-              <a:t>detailsViewModel = </a:t>
+              <a:t>D</a:t>
+            </a:r>
+            <a:r>
+              <a:rPr lang="da-DK" sz="1400" smtClean="0">
+                <a:latin typeface="Consolas" panose="020B0609020204030204" pitchFamily="49" charset="0"/>
+              </a:rPr>
+              <a:t>etailsViewModel </a:t>
+            </a:r>
+            <a:r>
+              <a:rPr lang="da-DK" sz="1400">
+                <a:latin typeface="Consolas" panose="020B0609020204030204" pitchFamily="49" charset="0"/>
+              </a:rPr>
+              <a:t>= </a:t>
             </a:r>
             <a:r>
               <a:rPr lang="da-DK" sz="1400">
@@ -22043,74 +22241,33 @@
               <a:rPr lang="da-DK" sz="1400" smtClean="0">
                 <a:latin typeface="Consolas" panose="020B0609020204030204" pitchFamily="49" charset="0"/>
               </a:rPr>
-              <a:t>     </a:t>
-            </a:r>
-            <a:r>
-              <a:rPr lang="da-DK" sz="1400" b="1" smtClean="0">
-                <a:latin typeface="Consolas" panose="020B0609020204030204" pitchFamily="49" charset="0"/>
-              </a:rPr>
-              <a:t>OnPropertyChanged</a:t>
-            </a:r>
+              <a:t>     OnPropertyChanged</a:t>
+            </a:r>
+            <a:r>
+              <a:rPr lang="da-DK" sz="1400" smtClean="0">
+                <a:latin typeface="Consolas" panose="020B0609020204030204" pitchFamily="49" charset="0"/>
+              </a:rPr>
+              <a:t>();</a:t>
+            </a:r>
+          </a:p>
+          <a:p>
             <a:r>
               <a:rPr lang="da-DK" sz="1400">
                 <a:latin typeface="Consolas" panose="020B0609020204030204" pitchFamily="49" charset="0"/>
               </a:rPr>
-              <a:t>();</a:t>
-            </a:r>
-          </a:p>
-          <a:p>
-            <a:r>
-              <a:rPr lang="da-DK" sz="1400" smtClean="0">
-                <a:latin typeface="Consolas" panose="020B0609020204030204" pitchFamily="49" charset="0"/>
-              </a:rPr>
-              <a:t>      </a:t>
-            </a:r>
-            <a:r>
-              <a:rPr lang="da-DK" sz="1400" b="1" smtClean="0">
-                <a:latin typeface="Consolas" panose="020B0609020204030204" pitchFamily="49" charset="0"/>
-              </a:rPr>
-              <a:t>OnPropertyChanged</a:t>
-            </a:r>
-            <a:r>
-              <a:rPr lang="da-DK" sz="1400" smtClean="0">
-                <a:latin typeface="Consolas" panose="020B0609020204030204" pitchFamily="49" charset="0"/>
-              </a:rPr>
-              <a:t>(</a:t>
-            </a:r>
-            <a:r>
-              <a:rPr lang="da-DK" sz="1400">
-                <a:solidFill>
-                  <a:srgbClr val="0070C0"/>
-                </a:solidFill>
-                <a:latin typeface="Consolas" panose="020B0609020204030204" pitchFamily="49" charset="0"/>
-              </a:rPr>
-              <a:t>nameof</a:t>
-            </a:r>
-            <a:r>
-              <a:rPr lang="da-DK" sz="1400" smtClean="0">
-                <a:latin typeface="Consolas" panose="020B0609020204030204" pitchFamily="49" charset="0"/>
-              </a:rPr>
-              <a:t>(</a:t>
-            </a:r>
-            <a:r>
-              <a:rPr lang="da-DK" sz="1400" b="1" smtClean="0">
-                <a:latin typeface="Consolas" panose="020B0609020204030204" pitchFamily="49" charset="0"/>
-              </a:rPr>
-              <a:t>DetailsViewModel</a:t>
-            </a:r>
-            <a:r>
-              <a:rPr lang="da-DK" sz="1400">
-                <a:latin typeface="Consolas" panose="020B0609020204030204" pitchFamily="49" charset="0"/>
-              </a:rPr>
-              <a:t>));</a:t>
-            </a:r>
-          </a:p>
-          <a:p>
-            <a:r>
-              <a:rPr lang="da-DK" sz="1400" smtClean="0">
-                <a:latin typeface="Consolas" panose="020B0609020204030204" pitchFamily="49" charset="0"/>
-              </a:rPr>
-              <a:t>   }</a:t>
+              <a:t> </a:t>
+            </a:r>
+            <a:r>
+              <a:rPr lang="da-DK" sz="1400" smtClean="0">
+                <a:latin typeface="Consolas" panose="020B0609020204030204" pitchFamily="49" charset="0"/>
+              </a:rPr>
+              <a:t>  </a:t>
+            </a:r>
+            <a:r>
+              <a:rPr lang="da-DK" sz="1400" smtClean="0">
+                <a:latin typeface="Consolas" panose="020B0609020204030204" pitchFamily="49" charset="0"/>
+              </a:rPr>
+              <a:t>}</a:t>
             </a:r>
             <a:endParaRPr lang="da-DK" sz="1400">
               <a:latin typeface="Consolas" panose="020B0609020204030204" pitchFamily="49" charset="0"/>
@@ -22182,6 +22339,784 @@
       </p:grpSpPr>
       <p:sp>
         <p:nvSpPr>
+          <p:cNvPr id="3" name="Pladsholder til indhold 2"/>
+          <p:cNvSpPr>
+            <a:spLocks noGrp="1"/>
+          </p:cNvSpPr>
+          <p:nvPr>
+            <p:ph idx="1"/>
+          </p:nvPr>
+        </p:nvSpPr>
+        <p:spPr>
+          <a:xfrm>
+            <a:off x="838200" y="874929"/>
+            <a:ext cx="5884942" cy="777054"/>
+          </a:xfrm>
+        </p:spPr>
+        <p:txBody>
+          <a:bodyPr>
+            <a:normAutofit/>
+          </a:bodyPr>
+          <a:lstStyle/>
+          <a:p>
+            <a:pPr marL="0" indent="0">
+              <a:buNone/>
+            </a:pPr>
+            <a:r>
+              <a:rPr lang="da-DK" b="1" smtClean="0"/>
+              <a:t>[MasterDetailsViewModel</a:t>
+            </a:r>
+            <a:r>
+              <a:rPr lang="da-DK" b="1" smtClean="0"/>
+              <a:t>]</a:t>
+            </a:r>
+            <a:endParaRPr lang="da-DK" b="1" smtClean="0"/>
+          </a:p>
+        </p:txBody>
+      </p:sp>
+      <p:sp>
+        <p:nvSpPr>
+          <p:cNvPr id="6" name="Tekstfelt 5"/>
+          <p:cNvSpPr txBox="1"/>
+          <p:nvPr/>
+        </p:nvSpPr>
+        <p:spPr>
+          <a:xfrm>
+            <a:off x="8577540" y="1878137"/>
+            <a:ext cx="1737419" cy="338554"/>
+          </a:xfrm>
+          <a:prstGeom prst="rect">
+            <a:avLst/>
+          </a:prstGeom>
+          <a:noFill/>
+        </p:spPr>
+        <p:txBody>
+          <a:bodyPr wrap="square" rtlCol="0">
+            <a:spAutoFit/>
+          </a:bodyPr>
+          <a:lstStyle/>
+          <a:p>
+            <a:r>
+              <a:rPr lang="da-DK" sz="1600" smtClean="0">
+                <a:solidFill>
+                  <a:schemeClr val="bg1">
+                    <a:lumMod val="95000"/>
+                  </a:schemeClr>
+                </a:solidFill>
+              </a:rPr>
+              <a:t>DetailsViewModel</a:t>
+            </a:r>
+          </a:p>
+        </p:txBody>
+      </p:sp>
+      <p:sp>
+        <p:nvSpPr>
+          <p:cNvPr id="8" name="Tekstfelt 7"/>
+          <p:cNvSpPr txBox="1"/>
+          <p:nvPr/>
+        </p:nvSpPr>
+        <p:spPr>
+          <a:xfrm>
+            <a:off x="8577540" y="1878137"/>
+            <a:ext cx="1737419" cy="338554"/>
+          </a:xfrm>
+          <a:prstGeom prst="rect">
+            <a:avLst/>
+          </a:prstGeom>
+          <a:noFill/>
+        </p:spPr>
+        <p:txBody>
+          <a:bodyPr wrap="square" rtlCol="0">
+            <a:spAutoFit/>
+          </a:bodyPr>
+          <a:lstStyle/>
+          <a:p>
+            <a:r>
+              <a:rPr lang="da-DK" sz="1600" smtClean="0">
+                <a:solidFill>
+                  <a:schemeClr val="bg1">
+                    <a:lumMod val="95000"/>
+                  </a:schemeClr>
+                </a:solidFill>
+              </a:rPr>
+              <a:t>DetailsViewModel</a:t>
+            </a:r>
+          </a:p>
+        </p:txBody>
+      </p:sp>
+      <p:sp>
+        <p:nvSpPr>
+          <p:cNvPr id="11" name="Tekstfelt 10"/>
+          <p:cNvSpPr txBox="1"/>
+          <p:nvPr/>
+        </p:nvSpPr>
+        <p:spPr>
+          <a:xfrm>
+            <a:off x="785447" y="2270548"/>
+            <a:ext cx="5351583" cy="2677656"/>
+          </a:xfrm>
+          <a:prstGeom prst="rect">
+            <a:avLst/>
+          </a:prstGeom>
+          <a:solidFill>
+            <a:schemeClr val="bg1"/>
+          </a:solidFill>
+        </p:spPr>
+        <p:txBody>
+          <a:bodyPr wrap="square" rtlCol="0">
+            <a:spAutoFit/>
+          </a:bodyPr>
+          <a:lstStyle/>
+          <a:p>
+            <a:r>
+              <a:rPr lang="da-DK" sz="1400">
+                <a:solidFill>
+                  <a:srgbClr val="0070C0"/>
+                </a:solidFill>
+                <a:latin typeface="Consolas" panose="020B0609020204030204" pitchFamily="49" charset="0"/>
+              </a:rPr>
+              <a:t>public </a:t>
+            </a:r>
+            <a:r>
+              <a:rPr lang="da-DK" sz="1400" b="1" smtClean="0">
+                <a:solidFill>
+                  <a:schemeClr val="accent6">
+                    <a:lumMod val="75000"/>
+                  </a:schemeClr>
+                </a:solidFill>
+                <a:latin typeface="Consolas" panose="020B0609020204030204" pitchFamily="49" charset="0"/>
+              </a:rPr>
+              <a:t>CarDetailsViewModel</a:t>
+            </a:r>
+            <a:r>
+              <a:rPr lang="da-DK" sz="1400" smtClean="0">
+                <a:solidFill>
+                  <a:schemeClr val="accent6">
+                    <a:lumMod val="50000"/>
+                  </a:schemeClr>
+                </a:solidFill>
+                <a:latin typeface="Consolas" panose="020B0609020204030204" pitchFamily="49" charset="0"/>
+              </a:rPr>
+              <a:t> </a:t>
+            </a:r>
+            <a:r>
+              <a:rPr lang="da-DK" sz="1400" b="1" smtClean="0">
+                <a:solidFill>
+                  <a:schemeClr val="accent6">
+                    <a:lumMod val="50000"/>
+                  </a:schemeClr>
+                </a:solidFill>
+                <a:latin typeface="Consolas" panose="020B0609020204030204" pitchFamily="49" charset="0"/>
+              </a:rPr>
+              <a:t>DetailsViewModel</a:t>
+            </a:r>
+            <a:endParaRPr lang="da-DK" sz="1400" smtClean="0">
+              <a:solidFill>
+                <a:schemeClr val="accent6">
+                  <a:lumMod val="50000"/>
+                </a:schemeClr>
+              </a:solidFill>
+              <a:latin typeface="Consolas" panose="020B0609020204030204" pitchFamily="49" charset="0"/>
+            </a:endParaRPr>
+          </a:p>
+          <a:p>
+            <a:r>
+              <a:rPr lang="da-DK" sz="1400" smtClean="0">
+                <a:latin typeface="Consolas" panose="020B0609020204030204" pitchFamily="49" charset="0"/>
+              </a:rPr>
+              <a:t>{</a:t>
+            </a:r>
+          </a:p>
+          <a:p>
+            <a:r>
+              <a:rPr lang="da-DK" sz="1400" smtClean="0">
+                <a:solidFill>
+                  <a:srgbClr val="0070C0"/>
+                </a:solidFill>
+                <a:latin typeface="Consolas" panose="020B0609020204030204" pitchFamily="49" charset="0"/>
+              </a:rPr>
+              <a:t>   get</a:t>
+            </a:r>
+            <a:endParaRPr lang="da-DK" sz="1400" b="1" smtClean="0">
+              <a:solidFill>
+                <a:schemeClr val="accent6">
+                  <a:lumMod val="50000"/>
+                </a:schemeClr>
+              </a:solidFill>
+              <a:latin typeface="Consolas" panose="020B0609020204030204" pitchFamily="49" charset="0"/>
+            </a:endParaRPr>
+          </a:p>
+          <a:p>
+            <a:r>
+              <a:rPr lang="da-DK" sz="1400" b="1">
+                <a:solidFill>
+                  <a:schemeClr val="accent6">
+                    <a:lumMod val="50000"/>
+                  </a:schemeClr>
+                </a:solidFill>
+                <a:latin typeface="Consolas" panose="020B0609020204030204" pitchFamily="49" charset="0"/>
+              </a:rPr>
+              <a:t> </a:t>
+            </a:r>
+            <a:r>
+              <a:rPr lang="da-DK" sz="1400" b="1" smtClean="0">
+                <a:solidFill>
+                  <a:schemeClr val="accent6">
+                    <a:lumMod val="50000"/>
+                  </a:schemeClr>
+                </a:solidFill>
+                <a:latin typeface="Consolas" panose="020B0609020204030204" pitchFamily="49" charset="0"/>
+              </a:rPr>
+              <a:t>  </a:t>
+            </a:r>
+            <a:r>
+              <a:rPr lang="da-DK" sz="1400" smtClean="0">
+                <a:solidFill>
+                  <a:schemeClr val="accent6">
+                    <a:lumMod val="50000"/>
+                  </a:schemeClr>
+                </a:solidFill>
+                <a:latin typeface="Consolas" panose="020B0609020204030204" pitchFamily="49" charset="0"/>
+              </a:rPr>
+              <a:t>{</a:t>
+            </a:r>
+          </a:p>
+          <a:p>
+            <a:r>
+              <a:rPr lang="da-DK" sz="1400" smtClean="0">
+                <a:solidFill>
+                  <a:schemeClr val="accent6">
+                    <a:lumMod val="50000"/>
+                  </a:schemeClr>
+                </a:solidFill>
+                <a:latin typeface="Consolas" panose="020B0609020204030204" pitchFamily="49" charset="0"/>
+              </a:rPr>
+              <a:t>      </a:t>
+            </a:r>
+            <a:r>
+              <a:rPr lang="da-DK" sz="1400" smtClean="0">
+                <a:solidFill>
+                  <a:srgbClr val="0070C0"/>
+                </a:solidFill>
+                <a:latin typeface="Consolas" panose="020B0609020204030204" pitchFamily="49" charset="0"/>
+              </a:rPr>
+              <a:t>return </a:t>
+            </a:r>
+            <a:r>
+              <a:rPr lang="da-DK" sz="1400" smtClean="0">
+                <a:latin typeface="Consolas" panose="020B0609020204030204" pitchFamily="49" charset="0"/>
+              </a:rPr>
+              <a:t>_detailsViewModel;</a:t>
+            </a:r>
+            <a:endParaRPr lang="da-DK" sz="1400" smtClean="0">
+              <a:latin typeface="Consolas" panose="020B0609020204030204" pitchFamily="49" charset="0"/>
+            </a:endParaRPr>
+          </a:p>
+          <a:p>
+            <a:r>
+              <a:rPr lang="da-DK" sz="1400" smtClean="0">
+                <a:solidFill>
+                  <a:schemeClr val="accent6">
+                    <a:lumMod val="50000"/>
+                  </a:schemeClr>
+                </a:solidFill>
+                <a:latin typeface="Consolas" panose="020B0609020204030204" pitchFamily="49" charset="0"/>
+              </a:rPr>
+              <a:t>   </a:t>
+            </a:r>
+            <a:r>
+              <a:rPr lang="da-DK" sz="1400" smtClean="0">
+                <a:solidFill>
+                  <a:schemeClr val="accent6">
+                    <a:lumMod val="50000"/>
+                  </a:schemeClr>
+                </a:solidFill>
+                <a:latin typeface="Consolas" panose="020B0609020204030204" pitchFamily="49" charset="0"/>
+              </a:rPr>
+              <a:t>}</a:t>
+            </a:r>
+          </a:p>
+          <a:p>
+            <a:r>
+              <a:rPr lang="da-DK" sz="1400" smtClean="0">
+                <a:solidFill>
+                  <a:srgbClr val="0070C0"/>
+                </a:solidFill>
+                <a:latin typeface="Consolas" panose="020B0609020204030204" pitchFamily="49" charset="0"/>
+              </a:rPr>
+              <a:t>   </a:t>
+            </a:r>
+            <a:r>
+              <a:rPr lang="da-DK" sz="1400" smtClean="0">
+                <a:solidFill>
+                  <a:srgbClr val="FF0000"/>
+                </a:solidFill>
+                <a:latin typeface="Consolas" panose="020B0609020204030204" pitchFamily="49" charset="0"/>
+              </a:rPr>
+              <a:t>private </a:t>
+            </a:r>
+            <a:r>
+              <a:rPr lang="da-DK" sz="1400" smtClean="0">
+                <a:solidFill>
+                  <a:srgbClr val="0070C0"/>
+                </a:solidFill>
+                <a:latin typeface="Consolas" panose="020B0609020204030204" pitchFamily="49" charset="0"/>
+              </a:rPr>
+              <a:t>set</a:t>
+            </a:r>
+            <a:endParaRPr lang="da-DK" sz="1400" b="1">
+              <a:solidFill>
+                <a:schemeClr val="accent6">
+                  <a:lumMod val="50000"/>
+                </a:schemeClr>
+              </a:solidFill>
+              <a:latin typeface="Consolas" panose="020B0609020204030204" pitchFamily="49" charset="0"/>
+            </a:endParaRPr>
+          </a:p>
+          <a:p>
+            <a:r>
+              <a:rPr lang="da-DK" sz="1400" b="1">
+                <a:solidFill>
+                  <a:schemeClr val="accent6">
+                    <a:lumMod val="50000"/>
+                  </a:schemeClr>
+                </a:solidFill>
+                <a:latin typeface="Consolas" panose="020B0609020204030204" pitchFamily="49" charset="0"/>
+              </a:rPr>
+              <a:t>   </a:t>
+            </a:r>
+            <a:r>
+              <a:rPr lang="da-DK" sz="1400">
+                <a:solidFill>
+                  <a:schemeClr val="accent6">
+                    <a:lumMod val="50000"/>
+                  </a:schemeClr>
+                </a:solidFill>
+                <a:latin typeface="Consolas" panose="020B0609020204030204" pitchFamily="49" charset="0"/>
+              </a:rPr>
+              <a:t>{</a:t>
+            </a:r>
+          </a:p>
+          <a:p>
+            <a:r>
+              <a:rPr lang="da-DK" sz="1400">
+                <a:latin typeface="Consolas" panose="020B0609020204030204" pitchFamily="49" charset="0"/>
+              </a:rPr>
+              <a:t> </a:t>
+            </a:r>
+            <a:r>
+              <a:rPr lang="da-DK" sz="1400" smtClean="0">
+                <a:latin typeface="Consolas" panose="020B0609020204030204" pitchFamily="49" charset="0"/>
+              </a:rPr>
+              <a:t>     _</a:t>
+            </a:r>
+            <a:r>
+              <a:rPr lang="da-DK" sz="1400">
+                <a:latin typeface="Consolas" panose="020B0609020204030204" pitchFamily="49" charset="0"/>
+              </a:rPr>
+              <a:t>detailsViewModel</a:t>
+            </a:r>
+            <a:r>
+              <a:rPr lang="da-DK" sz="1400" smtClean="0">
+                <a:latin typeface="Consolas" panose="020B0609020204030204" pitchFamily="49" charset="0"/>
+              </a:rPr>
+              <a:t> = </a:t>
+            </a:r>
+            <a:r>
+              <a:rPr lang="da-DK" sz="1400">
+                <a:solidFill>
+                  <a:srgbClr val="0070C0"/>
+                </a:solidFill>
+                <a:latin typeface="Consolas" panose="020B0609020204030204" pitchFamily="49" charset="0"/>
+              </a:rPr>
+              <a:t>value</a:t>
+            </a:r>
+            <a:r>
+              <a:rPr lang="da-DK" sz="1400" smtClean="0">
+                <a:latin typeface="Consolas" panose="020B0609020204030204" pitchFamily="49" charset="0"/>
+              </a:rPr>
+              <a:t>;</a:t>
+            </a:r>
+          </a:p>
+          <a:p>
+            <a:r>
+              <a:rPr lang="da-DK" sz="1400" smtClean="0">
+                <a:latin typeface="Consolas" panose="020B0609020204030204" pitchFamily="49" charset="0"/>
+              </a:rPr>
+              <a:t>      OnPropertyChanged();</a:t>
+            </a:r>
+            <a:endParaRPr lang="da-DK" sz="1400">
+              <a:latin typeface="Consolas" panose="020B0609020204030204" pitchFamily="49" charset="0"/>
+            </a:endParaRPr>
+          </a:p>
+          <a:p>
+            <a:r>
+              <a:rPr lang="da-DK" sz="1400">
+                <a:solidFill>
+                  <a:schemeClr val="accent6">
+                    <a:lumMod val="50000"/>
+                  </a:schemeClr>
+                </a:solidFill>
+                <a:latin typeface="Consolas" panose="020B0609020204030204" pitchFamily="49" charset="0"/>
+              </a:rPr>
+              <a:t>   }</a:t>
+            </a:r>
+            <a:endParaRPr lang="da-DK" sz="1400">
+              <a:latin typeface="Consolas" panose="020B0609020204030204" pitchFamily="49" charset="0"/>
+            </a:endParaRPr>
+          </a:p>
+          <a:p>
+            <a:r>
+              <a:rPr lang="da-DK" sz="1400" smtClean="0">
+                <a:latin typeface="Consolas" panose="020B0609020204030204" pitchFamily="49" charset="0"/>
+              </a:rPr>
+              <a:t>}</a:t>
+            </a:r>
+          </a:p>
+        </p:txBody>
+      </p:sp>
+      <p:sp>
+        <p:nvSpPr>
+          <p:cNvPr id="12" name="Tekstfelt 11"/>
+          <p:cNvSpPr txBox="1"/>
+          <p:nvPr/>
+        </p:nvSpPr>
+        <p:spPr>
+          <a:xfrm>
+            <a:off x="7558601" y="4369995"/>
+            <a:ext cx="2353529" cy="338554"/>
+          </a:xfrm>
+          <a:prstGeom prst="rect">
+            <a:avLst/>
+          </a:prstGeom>
+          <a:noFill/>
+        </p:spPr>
+        <p:txBody>
+          <a:bodyPr wrap="none" rtlCol="0">
+            <a:spAutoFit/>
+          </a:bodyPr>
+          <a:lstStyle/>
+          <a:p>
+            <a:r>
+              <a:rPr lang="da-DK" sz="1600" smtClean="0">
+                <a:solidFill>
+                  <a:schemeClr val="bg1">
+                    <a:lumMod val="95000"/>
+                  </a:schemeClr>
+                </a:solidFill>
+              </a:rPr>
+              <a:t>ItemViewModelCollection</a:t>
+            </a:r>
+          </a:p>
+        </p:txBody>
+      </p:sp>
+      <p:sp>
+        <p:nvSpPr>
+          <p:cNvPr id="13" name="Tekstfelt 12"/>
+          <p:cNvSpPr txBox="1"/>
+          <p:nvPr/>
+        </p:nvSpPr>
+        <p:spPr>
+          <a:xfrm>
+            <a:off x="8248619" y="2824676"/>
+            <a:ext cx="1737419" cy="338554"/>
+          </a:xfrm>
+          <a:prstGeom prst="rect">
+            <a:avLst/>
+          </a:prstGeom>
+          <a:noFill/>
+        </p:spPr>
+        <p:txBody>
+          <a:bodyPr wrap="square" rtlCol="0">
+            <a:spAutoFit/>
+          </a:bodyPr>
+          <a:lstStyle/>
+          <a:p>
+            <a:r>
+              <a:rPr lang="da-DK" sz="1600" smtClean="0">
+                <a:solidFill>
+                  <a:schemeClr val="bg1">
+                    <a:lumMod val="95000"/>
+                  </a:schemeClr>
+                </a:solidFill>
+              </a:rPr>
+              <a:t>DetailsViewModel</a:t>
+            </a:r>
+          </a:p>
+        </p:txBody>
+      </p:sp>
+      <p:sp>
+        <p:nvSpPr>
+          <p:cNvPr id="14" name="Tekstfelt 13"/>
+          <p:cNvSpPr txBox="1"/>
+          <p:nvPr/>
+        </p:nvSpPr>
+        <p:spPr>
+          <a:xfrm>
+            <a:off x="8248619" y="2824676"/>
+            <a:ext cx="1737419" cy="338554"/>
+          </a:xfrm>
+          <a:prstGeom prst="rect">
+            <a:avLst/>
+          </a:prstGeom>
+          <a:noFill/>
+        </p:spPr>
+        <p:txBody>
+          <a:bodyPr wrap="square" rtlCol="0">
+            <a:spAutoFit/>
+          </a:bodyPr>
+          <a:lstStyle/>
+          <a:p>
+            <a:r>
+              <a:rPr lang="da-DK" sz="1600" smtClean="0">
+                <a:solidFill>
+                  <a:schemeClr val="bg1">
+                    <a:lumMod val="95000"/>
+                  </a:schemeClr>
+                </a:solidFill>
+              </a:rPr>
+              <a:t>DetailsViewModel</a:t>
+            </a:r>
+          </a:p>
+        </p:txBody>
+      </p:sp>
+      <p:sp>
+        <p:nvSpPr>
+          <p:cNvPr id="15" name="Afrundet rektangel 14"/>
+          <p:cNvSpPr/>
+          <p:nvPr/>
+        </p:nvSpPr>
+        <p:spPr>
+          <a:xfrm>
+            <a:off x="8044687" y="1203097"/>
+            <a:ext cx="3217563" cy="2927396"/>
+          </a:xfrm>
+          <a:prstGeom prst="roundRect">
+            <a:avLst/>
+          </a:prstGeom>
+          <a:effectLst>
+            <a:outerShdw blurRad="50800" dist="38100" dir="2700000" algn="tl" rotWithShape="0">
+              <a:prstClr val="black">
+                <a:alpha val="40000"/>
+              </a:prstClr>
+            </a:outerShdw>
+          </a:effectLst>
+          <a:scene3d>
+            <a:camera prst="orthographicFront"/>
+            <a:lightRig rig="threePt" dir="t"/>
+          </a:scene3d>
+          <a:sp3d>
+            <a:bevelT/>
+          </a:sp3d>
+        </p:spPr>
+        <p:style>
+          <a:lnRef idx="2">
+            <a:schemeClr val="accent1">
+              <a:shade val="50000"/>
+            </a:schemeClr>
+          </a:lnRef>
+          <a:fillRef idx="1">
+            <a:schemeClr val="accent1"/>
+          </a:fillRef>
+          <a:effectRef idx="0">
+            <a:schemeClr val="accent1"/>
+          </a:effectRef>
+          <a:fontRef idx="minor">
+            <a:schemeClr val="lt1"/>
+          </a:fontRef>
+        </p:style>
+        <p:txBody>
+          <a:bodyPr rtlCol="0" anchor="t"/>
+          <a:lstStyle/>
+          <a:p>
+            <a:pPr algn="r"/>
+            <a:r>
+              <a:rPr lang="da-DK" smtClean="0"/>
+              <a:t>MasterDetails</a:t>
+            </a:r>
+          </a:p>
+          <a:p>
+            <a:pPr algn="r"/>
+            <a:r>
+              <a:rPr lang="da-DK" smtClean="0">
+                <a:solidFill>
+                  <a:srgbClr val="FFFF00"/>
+                </a:solidFill>
+              </a:rPr>
+              <a:t>ViewModel</a:t>
+            </a:r>
+            <a:endParaRPr lang="da-DK">
+              <a:solidFill>
+                <a:srgbClr val="FFFF00"/>
+              </a:solidFill>
+            </a:endParaRPr>
+          </a:p>
+        </p:txBody>
+      </p:sp>
+      <p:sp>
+        <p:nvSpPr>
+          <p:cNvPr id="16" name="Tekstfelt 15"/>
+          <p:cNvSpPr txBox="1"/>
+          <p:nvPr/>
+        </p:nvSpPr>
+        <p:spPr>
+          <a:xfrm>
+            <a:off x="8214897" y="2132178"/>
+            <a:ext cx="2532692" cy="1600438"/>
+          </a:xfrm>
+          <a:prstGeom prst="rect">
+            <a:avLst/>
+          </a:prstGeom>
+          <a:noFill/>
+        </p:spPr>
+        <p:txBody>
+          <a:bodyPr wrap="square" rtlCol="0">
+            <a:spAutoFit/>
+          </a:bodyPr>
+          <a:lstStyle/>
+          <a:p>
+            <a:r>
+              <a:rPr lang="da-DK" sz="1400" smtClean="0">
+                <a:solidFill>
+                  <a:schemeClr val="bg1">
+                    <a:lumMod val="95000"/>
+                  </a:schemeClr>
+                </a:solidFill>
+              </a:rPr>
+              <a:t>DetailsViewModel</a:t>
+            </a:r>
+            <a:endParaRPr lang="da-DK" sz="1400">
+              <a:solidFill>
+                <a:schemeClr val="bg1">
+                  <a:lumMod val="95000"/>
+                </a:schemeClr>
+              </a:solidFill>
+            </a:endParaRPr>
+          </a:p>
+          <a:p>
+            <a:r>
+              <a:rPr lang="da-DK" sz="1400" smtClean="0">
+                <a:solidFill>
+                  <a:schemeClr val="bg1">
+                    <a:lumMod val="95000"/>
+                  </a:schemeClr>
+                </a:solidFill>
+              </a:rPr>
+              <a:t>ItemViewModelCollection</a:t>
+            </a:r>
+          </a:p>
+          <a:p>
+            <a:r>
+              <a:rPr lang="da-DK" sz="1400" smtClean="0">
+                <a:solidFill>
+                  <a:schemeClr val="bg1">
+                    <a:lumMod val="95000"/>
+                  </a:schemeClr>
+                </a:solidFill>
+              </a:rPr>
+              <a:t>ItemViewModelSelected</a:t>
+            </a:r>
+            <a:endParaRPr lang="da-DK" sz="1400">
+              <a:solidFill>
+                <a:schemeClr val="bg1">
+                  <a:lumMod val="95000"/>
+                </a:schemeClr>
+              </a:solidFill>
+            </a:endParaRPr>
+          </a:p>
+          <a:p>
+            <a:r>
+              <a:rPr lang="da-DK" sz="1400">
+                <a:solidFill>
+                  <a:srgbClr val="FF0000"/>
+                </a:solidFill>
+              </a:rPr>
+              <a:t>_catalog</a:t>
+            </a:r>
+          </a:p>
+          <a:p>
+            <a:r>
+              <a:rPr lang="da-DK" sz="1400">
+                <a:solidFill>
+                  <a:srgbClr val="FF0000"/>
+                </a:solidFill>
+              </a:rPr>
+              <a:t>_viewModelFactory</a:t>
+            </a:r>
+          </a:p>
+          <a:p>
+            <a:r>
+              <a:rPr lang="da-DK" sz="1400">
+                <a:solidFill>
+                  <a:srgbClr val="FF0000"/>
+                </a:solidFill>
+              </a:rPr>
+              <a:t>_detailsViewModel</a:t>
+            </a:r>
+          </a:p>
+          <a:p>
+            <a:r>
+              <a:rPr lang="da-DK" sz="1400">
+                <a:solidFill>
+                  <a:srgbClr val="FF0000"/>
+                </a:solidFill>
+              </a:rPr>
+              <a:t>_itemViewModelSelected</a:t>
+            </a:r>
+          </a:p>
+        </p:txBody>
+      </p:sp>
+    </p:spTree>
+    <p:extLst>
+      <p:ext uri="{BB962C8B-B14F-4D97-AF65-F5344CB8AC3E}">
+        <p14:creationId xmlns:p14="http://schemas.microsoft.com/office/powerpoint/2010/main" val="3801761086"/>
+      </p:ext>
+    </p:extLst>
+  </p:cSld>
+  <p:clrMapOvr>
+    <a:masterClrMapping/>
+  </p:clrMapOvr>
+  <mc:AlternateContent xmlns:mc="http://schemas.openxmlformats.org/markup-compatibility/2006" xmlns:p14="http://schemas.microsoft.com/office/powerpoint/2010/main">
+    <mc:Choice Requires="p14">
+      <p:transition spd="med" p14:dur="700">
+        <p:fade/>
+      </p:transition>
+    </mc:Choice>
+    <mc:Fallback xmlns="">
+      <p:transition spd="med">
+        <p:fade/>
+      </p:transition>
+    </mc:Fallback>
+  </mc:AlternateContent>
+  <p:timing>
+    <p:tnLst>
+      <p:par>
+        <p:cTn id="1" dur="indefinite" restart="never" nodeType="tmRoot"/>
+      </p:par>
+    </p:tnLst>
+  </p:timing>
+</p:sld>
+</file>
+
+<file path=ppt/slides/slide39.xml><?xml version="1.0" encoding="utf-8"?>
+<p:sld xmlns:a="http://schemas.openxmlformats.org/drawingml/2006/main" xmlns:r="http://schemas.openxmlformats.org/officeDocument/2006/relationships" xmlns:p="http://schemas.openxmlformats.org/presentationml/2006/main">
+  <p:cSld>
+    <p:spTree>
+      <p:nvGrpSpPr>
+        <p:cNvPr id="1" name=""/>
+        <p:cNvGrpSpPr/>
+        <p:nvPr/>
+      </p:nvGrpSpPr>
+      <p:grpSpPr>
+        <a:xfrm>
+          <a:off x="0" y="0"/>
+          <a:ext cx="0" cy="0"/>
+          <a:chOff x="0" y="0"/>
+          <a:chExt cx="0" cy="0"/>
+        </a:xfrm>
+      </p:grpSpPr>
+      <p:sp>
+        <p:nvSpPr>
           <p:cNvPr id="4" name="Afrundet rektangel 3"/>
           <p:cNvSpPr/>
           <p:nvPr/>
@@ -22766,7 +23701,189 @@
 </p:sld>
 </file>
 
-<file path=ppt/slides/slide39.xml><?xml version="1.0" encoding="utf-8"?>
+<file path=ppt/slides/slide4.xml><?xml version="1.0" encoding="utf-8"?>
+<p:sld xmlns:a="http://schemas.openxmlformats.org/drawingml/2006/main" xmlns:r="http://schemas.openxmlformats.org/officeDocument/2006/relationships" xmlns:p="http://schemas.openxmlformats.org/presentationml/2006/main">
+  <p:cSld>
+    <p:spTree>
+      <p:nvGrpSpPr>
+        <p:cNvPr id="1" name=""/>
+        <p:cNvGrpSpPr/>
+        <p:nvPr/>
+      </p:nvGrpSpPr>
+      <p:grpSpPr>
+        <a:xfrm>
+          <a:off x="0" y="0"/>
+          <a:ext cx="0" cy="0"/>
+          <a:chOff x="0" y="0"/>
+          <a:chExt cx="0" cy="0"/>
+        </a:xfrm>
+      </p:grpSpPr>
+      <p:sp>
+        <p:nvSpPr>
+          <p:cNvPr id="3" name="Pladsholder til indhold 2"/>
+          <p:cNvSpPr>
+            <a:spLocks noGrp="1"/>
+          </p:cNvSpPr>
+          <p:nvPr>
+            <p:ph idx="1"/>
+          </p:nvPr>
+        </p:nvSpPr>
+        <p:spPr>
+          <a:xfrm>
+            <a:off x="838200" y="763816"/>
+            <a:ext cx="5128846" cy="5413147"/>
+          </a:xfrm>
+        </p:spPr>
+        <p:txBody>
+          <a:bodyPr/>
+          <a:lstStyle/>
+          <a:p>
+            <a:r>
+              <a:rPr lang="da-DK" smtClean="0"/>
+              <a:t>C#</a:t>
+            </a:r>
+          </a:p>
+          <a:p>
+            <a:r>
+              <a:rPr lang="da-DK" smtClean="0"/>
+              <a:t>Rummer properties som </a:t>
+            </a:r>
+            <a:r>
+              <a:rPr lang="da-DK" err="1" smtClean="0"/>
+              <a:t>Views</a:t>
+            </a:r>
+            <a:r>
+              <a:rPr lang="da-DK" smtClean="0"/>
+              <a:t> kan binde til</a:t>
+            </a:r>
+          </a:p>
+          <a:p>
+            <a:r>
+              <a:rPr lang="da-DK" smtClean="0"/>
+              <a:t>Transformationer fra domæne-objekter til ViewModel-objekter</a:t>
+            </a:r>
+          </a:p>
+          <a:p>
+            <a:r>
+              <a:rPr lang="da-DK" smtClean="0"/>
+              <a:t>Kontakt til Model</a:t>
+            </a:r>
+          </a:p>
+          <a:p>
+            <a:r>
+              <a:rPr lang="da-DK" smtClean="0"/>
+              <a:t>Indhold drives af krav til Views</a:t>
+            </a:r>
+          </a:p>
+          <a:p>
+            <a:r>
+              <a:rPr lang="da-DK" smtClean="0"/>
+              <a:t>Skal ”servicere” Views</a:t>
+            </a:r>
+          </a:p>
+        </p:txBody>
+      </p:sp>
+      <p:sp>
+        <p:nvSpPr>
+          <p:cNvPr id="4" name="Afrundet rektangel 3"/>
+          <p:cNvSpPr/>
+          <p:nvPr/>
+        </p:nvSpPr>
+        <p:spPr>
+          <a:xfrm>
+            <a:off x="6765192" y="763816"/>
+            <a:ext cx="4560276" cy="5413147"/>
+          </a:xfrm>
+          <a:prstGeom prst="roundRect">
+            <a:avLst/>
+          </a:prstGeom>
+          <a:solidFill>
+            <a:srgbClr val="0070C0"/>
+          </a:solidFill>
+          <a:effectLst>
+            <a:outerShdw blurRad="50800" dist="38100" dir="2700000" algn="tl" rotWithShape="0">
+              <a:prstClr val="black">
+                <a:alpha val="40000"/>
+              </a:prstClr>
+            </a:outerShdw>
+          </a:effectLst>
+          <a:scene3d>
+            <a:camera prst="orthographicFront"/>
+            <a:lightRig rig="threePt" dir="t"/>
+          </a:scene3d>
+          <a:sp3d>
+            <a:bevelT/>
+          </a:sp3d>
+        </p:spPr>
+        <p:style>
+          <a:lnRef idx="2">
+            <a:schemeClr val="accent1">
+              <a:shade val="50000"/>
+            </a:schemeClr>
+          </a:lnRef>
+          <a:fillRef idx="1">
+            <a:schemeClr val="accent1"/>
+          </a:fillRef>
+          <a:effectRef idx="0">
+            <a:schemeClr val="accent1"/>
+          </a:effectRef>
+          <a:fontRef idx="minor">
+            <a:schemeClr val="lt1"/>
+          </a:fontRef>
+        </p:style>
+        <p:txBody>
+          <a:bodyPr rtlCol="0" anchor="ctr"/>
+          <a:lstStyle/>
+          <a:p>
+            <a:pPr algn="ctr"/>
+            <a:r>
+              <a:rPr lang="da-DK" sz="4800" smtClean="0">
+                <a:solidFill>
+                  <a:schemeClr val="bg1"/>
+                </a:solidFill>
+              </a:rPr>
+              <a:t>View</a:t>
+            </a:r>
+          </a:p>
+          <a:p>
+            <a:pPr algn="ctr"/>
+            <a:r>
+              <a:rPr lang="da-DK" sz="4800" smtClean="0">
+                <a:solidFill>
+                  <a:srgbClr val="FFFF00"/>
+                </a:solidFill>
+              </a:rPr>
+              <a:t>Model</a:t>
+            </a:r>
+            <a:endParaRPr lang="da-DK" sz="4800">
+              <a:solidFill>
+                <a:srgbClr val="FFFF00"/>
+              </a:solidFill>
+            </a:endParaRPr>
+          </a:p>
+        </p:txBody>
+      </p:sp>
+    </p:spTree>
+    <p:extLst>
+      <p:ext uri="{BB962C8B-B14F-4D97-AF65-F5344CB8AC3E}">
+        <p14:creationId xmlns:p14="http://schemas.microsoft.com/office/powerpoint/2010/main" val="853300199"/>
+      </p:ext>
+    </p:extLst>
+  </p:cSld>
+  <p:clrMapOvr>
+    <a:masterClrMapping/>
+  </p:clrMapOvr>
+  <p:timing>
+    <p:tnLst>
+      <p:par>
+        <p:cTn id="1" dur="indefinite" restart="never" nodeType="tmRoot"/>
+      </p:par>
+    </p:tnLst>
+  </p:timing>
+</p:sld>
+</file>
+
+<file path=ppt/slides/slide40.xml><?xml version="1.0" encoding="utf-8"?>
 <p:sld xmlns:a="http://schemas.openxmlformats.org/drawingml/2006/main" xmlns:r="http://schemas.openxmlformats.org/officeDocument/2006/relationships" xmlns:p="http://schemas.openxmlformats.org/presentationml/2006/main">
   <p:cSld>
     <p:spTree>
@@ -23381,189 +24498,7 @@
 </p:sld>
 </file>
 
-<file path=ppt/slides/slide4.xml><?xml version="1.0" encoding="utf-8"?>
-<p:sld xmlns:a="http://schemas.openxmlformats.org/drawingml/2006/main" xmlns:r="http://schemas.openxmlformats.org/officeDocument/2006/relationships" xmlns:p="http://schemas.openxmlformats.org/presentationml/2006/main">
-  <p:cSld>
-    <p:spTree>
-      <p:nvGrpSpPr>
-        <p:cNvPr id="1" name=""/>
-        <p:cNvGrpSpPr/>
-        <p:nvPr/>
-      </p:nvGrpSpPr>
-      <p:grpSpPr>
-        <a:xfrm>
-          <a:off x="0" y="0"/>
-          <a:ext cx="0" cy="0"/>
-          <a:chOff x="0" y="0"/>
-          <a:chExt cx="0" cy="0"/>
-        </a:xfrm>
-      </p:grpSpPr>
-      <p:sp>
-        <p:nvSpPr>
-          <p:cNvPr id="3" name="Pladsholder til indhold 2"/>
-          <p:cNvSpPr>
-            <a:spLocks noGrp="1"/>
-          </p:cNvSpPr>
-          <p:nvPr>
-            <p:ph idx="1"/>
-          </p:nvPr>
-        </p:nvSpPr>
-        <p:spPr>
-          <a:xfrm>
-            <a:off x="838200" y="763816"/>
-            <a:ext cx="5128846" cy="5413147"/>
-          </a:xfrm>
-        </p:spPr>
-        <p:txBody>
-          <a:bodyPr/>
-          <a:lstStyle/>
-          <a:p>
-            <a:r>
-              <a:rPr lang="da-DK" smtClean="0"/>
-              <a:t>C#</a:t>
-            </a:r>
-          </a:p>
-          <a:p>
-            <a:r>
-              <a:rPr lang="da-DK" smtClean="0"/>
-              <a:t>Rummer properties som </a:t>
-            </a:r>
-            <a:r>
-              <a:rPr lang="da-DK" err="1" smtClean="0"/>
-              <a:t>Views</a:t>
-            </a:r>
-            <a:r>
-              <a:rPr lang="da-DK" smtClean="0"/>
-              <a:t> kan binde til</a:t>
-            </a:r>
-          </a:p>
-          <a:p>
-            <a:r>
-              <a:rPr lang="da-DK" smtClean="0"/>
-              <a:t>Transformationer fra domæne-objekter til ViewModel-objekter</a:t>
-            </a:r>
-          </a:p>
-          <a:p>
-            <a:r>
-              <a:rPr lang="da-DK" smtClean="0"/>
-              <a:t>Kontakt til Model</a:t>
-            </a:r>
-          </a:p>
-          <a:p>
-            <a:r>
-              <a:rPr lang="da-DK" smtClean="0"/>
-              <a:t>Indhold drives af krav til Views</a:t>
-            </a:r>
-          </a:p>
-          <a:p>
-            <a:r>
-              <a:rPr lang="da-DK" smtClean="0"/>
-              <a:t>Skal ”servicere” Views</a:t>
-            </a:r>
-          </a:p>
-        </p:txBody>
-      </p:sp>
-      <p:sp>
-        <p:nvSpPr>
-          <p:cNvPr id="4" name="Afrundet rektangel 3"/>
-          <p:cNvSpPr/>
-          <p:nvPr/>
-        </p:nvSpPr>
-        <p:spPr>
-          <a:xfrm>
-            <a:off x="6765192" y="763816"/>
-            <a:ext cx="4560276" cy="5413147"/>
-          </a:xfrm>
-          <a:prstGeom prst="roundRect">
-            <a:avLst/>
-          </a:prstGeom>
-          <a:solidFill>
-            <a:srgbClr val="0070C0"/>
-          </a:solidFill>
-          <a:effectLst>
-            <a:outerShdw blurRad="50800" dist="38100" dir="2700000" algn="tl" rotWithShape="0">
-              <a:prstClr val="black">
-                <a:alpha val="40000"/>
-              </a:prstClr>
-            </a:outerShdw>
-          </a:effectLst>
-          <a:scene3d>
-            <a:camera prst="orthographicFront"/>
-            <a:lightRig rig="threePt" dir="t"/>
-          </a:scene3d>
-          <a:sp3d>
-            <a:bevelT/>
-          </a:sp3d>
-        </p:spPr>
-        <p:style>
-          <a:lnRef idx="2">
-            <a:schemeClr val="accent1">
-              <a:shade val="50000"/>
-            </a:schemeClr>
-          </a:lnRef>
-          <a:fillRef idx="1">
-            <a:schemeClr val="accent1"/>
-          </a:fillRef>
-          <a:effectRef idx="0">
-            <a:schemeClr val="accent1"/>
-          </a:effectRef>
-          <a:fontRef idx="minor">
-            <a:schemeClr val="lt1"/>
-          </a:fontRef>
-        </p:style>
-        <p:txBody>
-          <a:bodyPr rtlCol="0" anchor="ctr"/>
-          <a:lstStyle/>
-          <a:p>
-            <a:pPr algn="ctr"/>
-            <a:r>
-              <a:rPr lang="da-DK" sz="4800" smtClean="0">
-                <a:solidFill>
-                  <a:schemeClr val="bg1"/>
-                </a:solidFill>
-              </a:rPr>
-              <a:t>View</a:t>
-            </a:r>
-          </a:p>
-          <a:p>
-            <a:pPr algn="ctr"/>
-            <a:r>
-              <a:rPr lang="da-DK" sz="4800" smtClean="0">
-                <a:solidFill>
-                  <a:srgbClr val="FFFF00"/>
-                </a:solidFill>
-              </a:rPr>
-              <a:t>Model</a:t>
-            </a:r>
-            <a:endParaRPr lang="da-DK" sz="4800">
-              <a:solidFill>
-                <a:srgbClr val="FFFF00"/>
-              </a:solidFill>
-            </a:endParaRPr>
-          </a:p>
-        </p:txBody>
-      </p:sp>
-    </p:spTree>
-    <p:extLst>
-      <p:ext uri="{BB962C8B-B14F-4D97-AF65-F5344CB8AC3E}">
-        <p14:creationId xmlns:p14="http://schemas.microsoft.com/office/powerpoint/2010/main" val="853300199"/>
-      </p:ext>
-    </p:extLst>
-  </p:cSld>
-  <p:clrMapOvr>
-    <a:masterClrMapping/>
-  </p:clrMapOvr>
-  <p:timing>
-    <p:tnLst>
-      <p:par>
-        <p:cTn id="1" dur="indefinite" restart="never" nodeType="tmRoot"/>
-      </p:par>
-    </p:tnLst>
-  </p:timing>
-</p:sld>
-</file>
-
-<file path=ppt/slides/slide40.xml><?xml version="1.0" encoding="utf-8"?>
+<file path=ppt/slides/slide41.xml><?xml version="1.0" encoding="utf-8"?>
 <p:sld xmlns:a="http://schemas.openxmlformats.org/drawingml/2006/main" xmlns:r="http://schemas.openxmlformats.org/officeDocument/2006/relationships" xmlns:p="http://schemas.openxmlformats.org/presentationml/2006/main">
   <p:cSld>
     <p:spTree>
@@ -27149,7 +28084,7 @@
 
 <file path=customXml/item1.xml><?xml version="1.0" encoding="utf-8"?>
 <Control xmlns="http://schemas.microsoft.com/VisualStudio/2011/storyboarding/control">
-  <Id Name="226fd434-1369-4d8d-891e-061bd502fc1e" Revision="1" Stencil="System.MyShapes" StencilVersion="1.0"/>
+  <Id Name="5e505f8e-b0aa-429a-bb4c-92ab0e8a8ee6" RevisionId="d2083f08-ba4f-4330-87aa-e4d23a4443d7" Stencil="172d6d98-e5c9-42e9-a209-79f7a94bbd38" StencilRevisionId="00000000-0000-0000-0000-000000000000" StencilVersion="0.0"/>
 </Control>
 </file>
 
@@ -27161,7 +28096,7 @@
 
 <file path=customXml/item3.xml><?xml version="1.0" encoding="utf-8"?>
 <Control xmlns="http://schemas.microsoft.com/VisualStudio/2011/storyboarding/control">
-  <Id Name="5e505f8e-b0aa-429a-bb4c-92ab0e8a8ee6" RevisionId="d2083f08-ba4f-4330-87aa-e4d23a4443d7" Stencil="172d6d98-e5c9-42e9-a209-79f7a94bbd38" StencilRevisionId="00000000-0000-0000-0000-000000000000" StencilVersion="0.0"/>
+  <Id Name="226fd434-1369-4d8d-891e-061bd502fc1e" Revision="1" Stencil="System.MyShapes" StencilVersion="1.0"/>
 </Control>
 </file>
 
@@ -27172,7 +28107,7 @@
 </file>
 
 <file path=customXml/itemProps1.xml><?xml version="1.0" encoding="utf-8"?>
-<ds:datastoreItem xmlns:ds="http://schemas.openxmlformats.org/officeDocument/2006/customXml" ds:itemID="{1D75BEB4-7785-47E6-ACAF-EEE5B6F45926}">
+<ds:datastoreItem xmlns:ds="http://schemas.openxmlformats.org/officeDocument/2006/customXml" ds:itemID="{22271091-DDCE-44B5-B608-BB96BCA0C299}">
   <ds:schemaRefs>
     <ds:schemaRef ds:uri="http://schemas.microsoft.com/VisualStudio/2011/storyboarding/control"/>
   </ds:schemaRefs>
@@ -27188,7 +28123,7 @@
 </file>
 
 <file path=customXml/itemProps3.xml><?xml version="1.0" encoding="utf-8"?>
-<ds:datastoreItem xmlns:ds="http://schemas.openxmlformats.org/officeDocument/2006/customXml" ds:itemID="{22271091-DDCE-44B5-B608-BB96BCA0C299}">
+<ds:datastoreItem xmlns:ds="http://schemas.openxmlformats.org/officeDocument/2006/customXml" ds:itemID="{1D75BEB4-7785-47E6-ACAF-EEE5B6F45926}">
   <ds:schemaRefs>
     <ds:schemaRef ds:uri="http://schemas.microsoft.com/VisualStudio/2011/storyboarding/control"/>
   </ds:schemaRefs>

</xml_diff>